<commit_message>
Added Anima2d for 2d bone based animation, added Pickaxe animation and state.
</commit_message>
<xml_diff>
--- a/Assets/Textures/GameIcons.pptx
+++ b/Assets/Textures/GameIcons.pptx
@@ -6,6 +6,7 @@
   </p:sldMasterIdLst>
   <p:sldIdLst>
     <p:sldId id="256" r:id="rId2"/>
+    <p:sldId id="257" r:id="rId3"/>
   </p:sldIdLst>
   <p:sldSz cx="12192000" cy="6858000"/>
   <p:notesSz cx="6858000" cy="9144000"/>
@@ -122,7 +123,7 @@
             <a:srgbClr val="F26B43"/>
           </p15:clr>
         </p15:guide>
-        <p15:guide id="4" pos="2861" userDrawn="1">
+        <p15:guide id="4" pos="4877" userDrawn="1">
           <p15:clr>
             <a:srgbClr val="F26B43"/>
           </p15:clr>
@@ -294,7 +295,7 @@
           <a:p>
             <a:fld id="{B26F1523-B6E2-4590-B506-C637F86D1ACA}" type="datetimeFigureOut">
               <a:rPr lang="en-US" smtClean="0"/>
-              <a:t>16-Jun-18</a:t>
+              <a:t>23-Jun-18</a:t>
             </a:fld>
             <a:endParaRPr lang="en-US"/>
           </a:p>
@@ -464,7 +465,7 @@
           <a:p>
             <a:fld id="{B26F1523-B6E2-4590-B506-C637F86D1ACA}" type="datetimeFigureOut">
               <a:rPr lang="en-US" smtClean="0"/>
-              <a:t>16-Jun-18</a:t>
+              <a:t>23-Jun-18</a:t>
             </a:fld>
             <a:endParaRPr lang="en-US"/>
           </a:p>
@@ -644,7 +645,7 @@
           <a:p>
             <a:fld id="{B26F1523-B6E2-4590-B506-C637F86D1ACA}" type="datetimeFigureOut">
               <a:rPr lang="en-US" smtClean="0"/>
-              <a:t>16-Jun-18</a:t>
+              <a:t>23-Jun-18</a:t>
             </a:fld>
             <a:endParaRPr lang="en-US"/>
           </a:p>
@@ -814,7 +815,7 @@
           <a:p>
             <a:fld id="{B26F1523-B6E2-4590-B506-C637F86D1ACA}" type="datetimeFigureOut">
               <a:rPr lang="en-US" smtClean="0"/>
-              <a:t>16-Jun-18</a:t>
+              <a:t>23-Jun-18</a:t>
             </a:fld>
             <a:endParaRPr lang="en-US"/>
           </a:p>
@@ -1060,7 +1061,7 @@
           <a:p>
             <a:fld id="{B26F1523-B6E2-4590-B506-C637F86D1ACA}" type="datetimeFigureOut">
               <a:rPr lang="en-US" smtClean="0"/>
-              <a:t>16-Jun-18</a:t>
+              <a:t>23-Jun-18</a:t>
             </a:fld>
             <a:endParaRPr lang="en-US"/>
           </a:p>
@@ -1292,7 +1293,7 @@
           <a:p>
             <a:fld id="{B26F1523-B6E2-4590-B506-C637F86D1ACA}" type="datetimeFigureOut">
               <a:rPr lang="en-US" smtClean="0"/>
-              <a:t>16-Jun-18</a:t>
+              <a:t>23-Jun-18</a:t>
             </a:fld>
             <a:endParaRPr lang="en-US"/>
           </a:p>
@@ -1659,7 +1660,7 @@
           <a:p>
             <a:fld id="{B26F1523-B6E2-4590-B506-C637F86D1ACA}" type="datetimeFigureOut">
               <a:rPr lang="en-US" smtClean="0"/>
-              <a:t>16-Jun-18</a:t>
+              <a:t>23-Jun-18</a:t>
             </a:fld>
             <a:endParaRPr lang="en-US"/>
           </a:p>
@@ -1777,7 +1778,7 @@
           <a:p>
             <a:fld id="{B26F1523-B6E2-4590-B506-C637F86D1ACA}" type="datetimeFigureOut">
               <a:rPr lang="en-US" smtClean="0"/>
-              <a:t>16-Jun-18</a:t>
+              <a:t>23-Jun-18</a:t>
             </a:fld>
             <a:endParaRPr lang="en-US"/>
           </a:p>
@@ -1872,7 +1873,7 @@
           <a:p>
             <a:fld id="{B26F1523-B6E2-4590-B506-C637F86D1ACA}" type="datetimeFigureOut">
               <a:rPr lang="en-US" smtClean="0"/>
-              <a:t>16-Jun-18</a:t>
+              <a:t>23-Jun-18</a:t>
             </a:fld>
             <a:endParaRPr lang="en-US"/>
           </a:p>
@@ -2149,7 +2150,7 @@
           <a:p>
             <a:fld id="{B26F1523-B6E2-4590-B506-C637F86D1ACA}" type="datetimeFigureOut">
               <a:rPr lang="en-US" smtClean="0"/>
-              <a:t>16-Jun-18</a:t>
+              <a:t>23-Jun-18</a:t>
             </a:fld>
             <a:endParaRPr lang="en-US"/>
           </a:p>
@@ -2402,7 +2403,7 @@
           <a:p>
             <a:fld id="{B26F1523-B6E2-4590-B506-C637F86D1ACA}" type="datetimeFigureOut">
               <a:rPr lang="en-US" smtClean="0"/>
-              <a:t>16-Jun-18</a:t>
+              <a:t>23-Jun-18</a:t>
             </a:fld>
             <a:endParaRPr lang="en-US"/>
           </a:p>
@@ -2615,7 +2616,7 @@
           <a:p>
             <a:fld id="{B26F1523-B6E2-4590-B506-C637F86D1ACA}" type="datetimeFigureOut">
               <a:rPr lang="en-US" smtClean="0"/>
-              <a:t>16-Jun-18</a:t>
+              <a:t>23-Jun-18</a:t>
             </a:fld>
             <a:endParaRPr lang="en-US"/>
           </a:p>
@@ -3092,6 +3093,2931 @@
 </p:sld>
 </file>
 
+<file path=ppt/slides/slide2.xml><?xml version="1.0" encoding="utf-8"?>
+<p:sld xmlns:a="http://schemas.openxmlformats.org/drawingml/2006/main" xmlns:r="http://schemas.openxmlformats.org/officeDocument/2006/relationships" xmlns:p="http://schemas.openxmlformats.org/presentationml/2006/main">
+  <p:cSld>
+    <p:bg>
+      <p:bgPr>
+        <a:solidFill>
+          <a:schemeClr val="bg1">
+            <a:lumMod val="50000"/>
+          </a:schemeClr>
+        </a:solidFill>
+        <a:effectLst/>
+      </p:bgPr>
+    </p:bg>
+    <p:spTree>
+      <p:nvGrpSpPr>
+        <p:cNvPr id="1" name=""/>
+        <p:cNvGrpSpPr/>
+        <p:nvPr/>
+      </p:nvGrpSpPr>
+      <p:grpSpPr>
+        <a:xfrm>
+          <a:off x="0" y="0"/>
+          <a:ext cx="0" cy="0"/>
+          <a:chOff x="0" y="0"/>
+          <a:chExt cx="0" cy="0"/>
+        </a:xfrm>
+      </p:grpSpPr>
+      <p:sp>
+        <p:nvSpPr>
+          <p:cNvPr id="11" name="Rounded Rectangle 7"/>
+          <p:cNvSpPr/>
+          <p:nvPr/>
+        </p:nvSpPr>
+        <p:spPr>
+          <a:xfrm>
+            <a:off x="7189666" y="4925818"/>
+            <a:ext cx="692008" cy="1542331"/>
+          </a:xfrm>
+          <a:custGeom>
+            <a:avLst/>
+            <a:gdLst>
+              <a:gd name="connsiteX0" fmla="*/ 0 w 365756"/>
+              <a:gd name="connsiteY0" fmla="*/ 182878 h 927809"/>
+              <a:gd name="connsiteX1" fmla="*/ 182878 w 365756"/>
+              <a:gd name="connsiteY1" fmla="*/ 0 h 927809"/>
+              <a:gd name="connsiteX2" fmla="*/ 182878 w 365756"/>
+              <a:gd name="connsiteY2" fmla="*/ 0 h 927809"/>
+              <a:gd name="connsiteX3" fmla="*/ 365756 w 365756"/>
+              <a:gd name="connsiteY3" fmla="*/ 182878 h 927809"/>
+              <a:gd name="connsiteX4" fmla="*/ 365756 w 365756"/>
+              <a:gd name="connsiteY4" fmla="*/ 744931 h 927809"/>
+              <a:gd name="connsiteX5" fmla="*/ 182878 w 365756"/>
+              <a:gd name="connsiteY5" fmla="*/ 927809 h 927809"/>
+              <a:gd name="connsiteX6" fmla="*/ 182878 w 365756"/>
+              <a:gd name="connsiteY6" fmla="*/ 927809 h 927809"/>
+              <a:gd name="connsiteX7" fmla="*/ 0 w 365756"/>
+              <a:gd name="connsiteY7" fmla="*/ 744931 h 927809"/>
+              <a:gd name="connsiteX8" fmla="*/ 0 w 365756"/>
+              <a:gd name="connsiteY8" fmla="*/ 182878 h 927809"/>
+              <a:gd name="connsiteX0" fmla="*/ 0 w 365756"/>
+              <a:gd name="connsiteY0" fmla="*/ 182878 h 927809"/>
+              <a:gd name="connsiteX1" fmla="*/ 182878 w 365756"/>
+              <a:gd name="connsiteY1" fmla="*/ 0 h 927809"/>
+              <a:gd name="connsiteX2" fmla="*/ 365756 w 365756"/>
+              <a:gd name="connsiteY2" fmla="*/ 182878 h 927809"/>
+              <a:gd name="connsiteX3" fmla="*/ 365756 w 365756"/>
+              <a:gd name="connsiteY3" fmla="*/ 744931 h 927809"/>
+              <a:gd name="connsiteX4" fmla="*/ 182878 w 365756"/>
+              <a:gd name="connsiteY4" fmla="*/ 927809 h 927809"/>
+              <a:gd name="connsiteX5" fmla="*/ 182878 w 365756"/>
+              <a:gd name="connsiteY5" fmla="*/ 927809 h 927809"/>
+              <a:gd name="connsiteX6" fmla="*/ 0 w 365756"/>
+              <a:gd name="connsiteY6" fmla="*/ 744931 h 927809"/>
+              <a:gd name="connsiteX7" fmla="*/ 0 w 365756"/>
+              <a:gd name="connsiteY7" fmla="*/ 182878 h 927809"/>
+              <a:gd name="connsiteX0" fmla="*/ 0 w 365756"/>
+              <a:gd name="connsiteY0" fmla="*/ 70257 h 815188"/>
+              <a:gd name="connsiteX1" fmla="*/ 365756 w 365756"/>
+              <a:gd name="connsiteY1" fmla="*/ 70257 h 815188"/>
+              <a:gd name="connsiteX2" fmla="*/ 365756 w 365756"/>
+              <a:gd name="connsiteY2" fmla="*/ 632310 h 815188"/>
+              <a:gd name="connsiteX3" fmla="*/ 182878 w 365756"/>
+              <a:gd name="connsiteY3" fmla="*/ 815188 h 815188"/>
+              <a:gd name="connsiteX4" fmla="*/ 182878 w 365756"/>
+              <a:gd name="connsiteY4" fmla="*/ 815188 h 815188"/>
+              <a:gd name="connsiteX5" fmla="*/ 0 w 365756"/>
+              <a:gd name="connsiteY5" fmla="*/ 632310 h 815188"/>
+              <a:gd name="connsiteX6" fmla="*/ 0 w 365756"/>
+              <a:gd name="connsiteY6" fmla="*/ 70257 h 815188"/>
+            </a:gdLst>
+            <a:ahLst/>
+            <a:cxnLst>
+              <a:cxn ang="0">
+                <a:pos x="connsiteX0" y="connsiteY0"/>
+              </a:cxn>
+              <a:cxn ang="0">
+                <a:pos x="connsiteX1" y="connsiteY1"/>
+              </a:cxn>
+              <a:cxn ang="0">
+                <a:pos x="connsiteX2" y="connsiteY2"/>
+              </a:cxn>
+              <a:cxn ang="0">
+                <a:pos x="connsiteX3" y="connsiteY3"/>
+              </a:cxn>
+              <a:cxn ang="0">
+                <a:pos x="connsiteX4" y="connsiteY4"/>
+              </a:cxn>
+              <a:cxn ang="0">
+                <a:pos x="connsiteX5" y="connsiteY5"/>
+              </a:cxn>
+              <a:cxn ang="0">
+                <a:pos x="connsiteX6" y="connsiteY6"/>
+              </a:cxn>
+            </a:cxnLst>
+            <a:rect l="l" t="t" r="r" b="b"/>
+            <a:pathLst>
+              <a:path w="365756" h="815188">
+                <a:moveTo>
+                  <a:pt x="0" y="70257"/>
+                </a:moveTo>
+                <a:cubicBezTo>
+                  <a:pt x="60959" y="-23418"/>
+                  <a:pt x="304797" y="-23418"/>
+                  <a:pt x="365756" y="70257"/>
+                </a:cubicBezTo>
+                <a:lnTo>
+                  <a:pt x="365756" y="632310"/>
+                </a:lnTo>
+                <a:cubicBezTo>
+                  <a:pt x="365756" y="733311"/>
+                  <a:pt x="283879" y="815188"/>
+                  <a:pt x="182878" y="815188"/>
+                </a:cubicBezTo>
+                <a:lnTo>
+                  <a:pt x="182878" y="815188"/>
+                </a:lnTo>
+                <a:cubicBezTo>
+                  <a:pt x="81877" y="815188"/>
+                  <a:pt x="0" y="733311"/>
+                  <a:pt x="0" y="632310"/>
+                </a:cubicBezTo>
+                <a:lnTo>
+                  <a:pt x="0" y="70257"/>
+                </a:lnTo>
+                <a:close/>
+              </a:path>
+            </a:pathLst>
+          </a:custGeom>
+          <a:solidFill>
+            <a:schemeClr val="bg1"/>
+          </a:solidFill>
+          <a:ln>
+            <a:noFill/>
+          </a:ln>
+        </p:spPr>
+        <p:style>
+          <a:lnRef idx="2">
+            <a:schemeClr val="accent1">
+              <a:shade val="50000"/>
+            </a:schemeClr>
+          </a:lnRef>
+          <a:fillRef idx="1">
+            <a:schemeClr val="accent1"/>
+          </a:fillRef>
+          <a:effectRef idx="0">
+            <a:schemeClr val="accent1"/>
+          </a:effectRef>
+          <a:fontRef idx="minor">
+            <a:schemeClr val="lt1"/>
+          </a:fontRef>
+        </p:style>
+        <p:txBody>
+          <a:bodyPr rtlCol="0" anchor="ctr"/>
+          <a:lstStyle/>
+          <a:p>
+            <a:pPr algn="ctr"/>
+            <a:endParaRPr lang="en-US"/>
+          </a:p>
+        </p:txBody>
+      </p:sp>
+      <p:sp>
+        <p:nvSpPr>
+          <p:cNvPr id="8" name="Rounded Rectangle 7"/>
+          <p:cNvSpPr/>
+          <p:nvPr/>
+        </p:nvSpPr>
+        <p:spPr>
+          <a:xfrm>
+            <a:off x="8408001" y="4930012"/>
+            <a:ext cx="692008" cy="1542331"/>
+          </a:xfrm>
+          <a:custGeom>
+            <a:avLst/>
+            <a:gdLst>
+              <a:gd name="connsiteX0" fmla="*/ 0 w 365756"/>
+              <a:gd name="connsiteY0" fmla="*/ 182878 h 927809"/>
+              <a:gd name="connsiteX1" fmla="*/ 182878 w 365756"/>
+              <a:gd name="connsiteY1" fmla="*/ 0 h 927809"/>
+              <a:gd name="connsiteX2" fmla="*/ 182878 w 365756"/>
+              <a:gd name="connsiteY2" fmla="*/ 0 h 927809"/>
+              <a:gd name="connsiteX3" fmla="*/ 365756 w 365756"/>
+              <a:gd name="connsiteY3" fmla="*/ 182878 h 927809"/>
+              <a:gd name="connsiteX4" fmla="*/ 365756 w 365756"/>
+              <a:gd name="connsiteY4" fmla="*/ 744931 h 927809"/>
+              <a:gd name="connsiteX5" fmla="*/ 182878 w 365756"/>
+              <a:gd name="connsiteY5" fmla="*/ 927809 h 927809"/>
+              <a:gd name="connsiteX6" fmla="*/ 182878 w 365756"/>
+              <a:gd name="connsiteY6" fmla="*/ 927809 h 927809"/>
+              <a:gd name="connsiteX7" fmla="*/ 0 w 365756"/>
+              <a:gd name="connsiteY7" fmla="*/ 744931 h 927809"/>
+              <a:gd name="connsiteX8" fmla="*/ 0 w 365756"/>
+              <a:gd name="connsiteY8" fmla="*/ 182878 h 927809"/>
+              <a:gd name="connsiteX0" fmla="*/ 0 w 365756"/>
+              <a:gd name="connsiteY0" fmla="*/ 182878 h 927809"/>
+              <a:gd name="connsiteX1" fmla="*/ 182878 w 365756"/>
+              <a:gd name="connsiteY1" fmla="*/ 0 h 927809"/>
+              <a:gd name="connsiteX2" fmla="*/ 365756 w 365756"/>
+              <a:gd name="connsiteY2" fmla="*/ 182878 h 927809"/>
+              <a:gd name="connsiteX3" fmla="*/ 365756 w 365756"/>
+              <a:gd name="connsiteY3" fmla="*/ 744931 h 927809"/>
+              <a:gd name="connsiteX4" fmla="*/ 182878 w 365756"/>
+              <a:gd name="connsiteY4" fmla="*/ 927809 h 927809"/>
+              <a:gd name="connsiteX5" fmla="*/ 182878 w 365756"/>
+              <a:gd name="connsiteY5" fmla="*/ 927809 h 927809"/>
+              <a:gd name="connsiteX6" fmla="*/ 0 w 365756"/>
+              <a:gd name="connsiteY6" fmla="*/ 744931 h 927809"/>
+              <a:gd name="connsiteX7" fmla="*/ 0 w 365756"/>
+              <a:gd name="connsiteY7" fmla="*/ 182878 h 927809"/>
+              <a:gd name="connsiteX0" fmla="*/ 0 w 365756"/>
+              <a:gd name="connsiteY0" fmla="*/ 70257 h 815188"/>
+              <a:gd name="connsiteX1" fmla="*/ 365756 w 365756"/>
+              <a:gd name="connsiteY1" fmla="*/ 70257 h 815188"/>
+              <a:gd name="connsiteX2" fmla="*/ 365756 w 365756"/>
+              <a:gd name="connsiteY2" fmla="*/ 632310 h 815188"/>
+              <a:gd name="connsiteX3" fmla="*/ 182878 w 365756"/>
+              <a:gd name="connsiteY3" fmla="*/ 815188 h 815188"/>
+              <a:gd name="connsiteX4" fmla="*/ 182878 w 365756"/>
+              <a:gd name="connsiteY4" fmla="*/ 815188 h 815188"/>
+              <a:gd name="connsiteX5" fmla="*/ 0 w 365756"/>
+              <a:gd name="connsiteY5" fmla="*/ 632310 h 815188"/>
+              <a:gd name="connsiteX6" fmla="*/ 0 w 365756"/>
+              <a:gd name="connsiteY6" fmla="*/ 70257 h 815188"/>
+            </a:gdLst>
+            <a:ahLst/>
+            <a:cxnLst>
+              <a:cxn ang="0">
+                <a:pos x="connsiteX0" y="connsiteY0"/>
+              </a:cxn>
+              <a:cxn ang="0">
+                <a:pos x="connsiteX1" y="connsiteY1"/>
+              </a:cxn>
+              <a:cxn ang="0">
+                <a:pos x="connsiteX2" y="connsiteY2"/>
+              </a:cxn>
+              <a:cxn ang="0">
+                <a:pos x="connsiteX3" y="connsiteY3"/>
+              </a:cxn>
+              <a:cxn ang="0">
+                <a:pos x="connsiteX4" y="connsiteY4"/>
+              </a:cxn>
+              <a:cxn ang="0">
+                <a:pos x="connsiteX5" y="connsiteY5"/>
+              </a:cxn>
+              <a:cxn ang="0">
+                <a:pos x="connsiteX6" y="connsiteY6"/>
+              </a:cxn>
+            </a:cxnLst>
+            <a:rect l="l" t="t" r="r" b="b"/>
+            <a:pathLst>
+              <a:path w="365756" h="815188">
+                <a:moveTo>
+                  <a:pt x="0" y="70257"/>
+                </a:moveTo>
+                <a:cubicBezTo>
+                  <a:pt x="60959" y="-23418"/>
+                  <a:pt x="304797" y="-23418"/>
+                  <a:pt x="365756" y="70257"/>
+                </a:cubicBezTo>
+                <a:lnTo>
+                  <a:pt x="365756" y="632310"/>
+                </a:lnTo>
+                <a:cubicBezTo>
+                  <a:pt x="365756" y="733311"/>
+                  <a:pt x="283879" y="815188"/>
+                  <a:pt x="182878" y="815188"/>
+                </a:cubicBezTo>
+                <a:lnTo>
+                  <a:pt x="182878" y="815188"/>
+                </a:lnTo>
+                <a:cubicBezTo>
+                  <a:pt x="81877" y="815188"/>
+                  <a:pt x="0" y="733311"/>
+                  <a:pt x="0" y="632310"/>
+                </a:cubicBezTo>
+                <a:lnTo>
+                  <a:pt x="0" y="70257"/>
+                </a:lnTo>
+                <a:close/>
+              </a:path>
+            </a:pathLst>
+          </a:custGeom>
+          <a:solidFill>
+            <a:schemeClr val="bg1"/>
+          </a:solidFill>
+          <a:ln>
+            <a:noFill/>
+          </a:ln>
+        </p:spPr>
+        <p:style>
+          <a:lnRef idx="2">
+            <a:schemeClr val="accent1">
+              <a:shade val="50000"/>
+            </a:schemeClr>
+          </a:lnRef>
+          <a:fillRef idx="1">
+            <a:schemeClr val="accent1"/>
+          </a:fillRef>
+          <a:effectRef idx="0">
+            <a:schemeClr val="accent1"/>
+          </a:effectRef>
+          <a:fontRef idx="minor">
+            <a:schemeClr val="lt1"/>
+          </a:fontRef>
+        </p:style>
+        <p:txBody>
+          <a:bodyPr rtlCol="0" anchor="ctr"/>
+          <a:lstStyle/>
+          <a:p>
+            <a:pPr algn="ctr"/>
+            <a:endParaRPr lang="en-US"/>
+          </a:p>
+        </p:txBody>
+      </p:sp>
+      <p:grpSp>
+        <p:nvGrpSpPr>
+          <p:cNvPr id="14" name="Group 13"/>
+          <p:cNvGrpSpPr/>
+          <p:nvPr/>
+        </p:nvGrpSpPr>
+        <p:grpSpPr>
+          <a:xfrm>
+            <a:off x="7040941" y="2777440"/>
+            <a:ext cx="2062632" cy="2109829"/>
+            <a:chOff x="6984797" y="1916767"/>
+            <a:chExt cx="2062632" cy="2109829"/>
+          </a:xfrm>
+        </p:grpSpPr>
+        <p:sp>
+          <p:nvSpPr>
+            <p:cNvPr id="10" name="Oval 1"/>
+            <p:cNvSpPr/>
+            <p:nvPr/>
+          </p:nvSpPr>
+          <p:spPr>
+            <a:xfrm>
+              <a:off x="7005537" y="2897912"/>
+              <a:ext cx="2021152" cy="1128684"/>
+            </a:xfrm>
+            <a:custGeom>
+              <a:avLst/>
+              <a:gdLst>
+                <a:gd name="connsiteX0" fmla="*/ 0 w 1396998"/>
+                <a:gd name="connsiteY0" fmla="*/ 914240 h 1828479"/>
+                <a:gd name="connsiteX1" fmla="*/ 698499 w 1396998"/>
+                <a:gd name="connsiteY1" fmla="*/ 0 h 1828479"/>
+                <a:gd name="connsiteX2" fmla="*/ 1396998 w 1396998"/>
+                <a:gd name="connsiteY2" fmla="*/ 914240 h 1828479"/>
+                <a:gd name="connsiteX3" fmla="*/ 698499 w 1396998"/>
+                <a:gd name="connsiteY3" fmla="*/ 1828480 h 1828479"/>
+                <a:gd name="connsiteX4" fmla="*/ 0 w 1396998"/>
+                <a:gd name="connsiteY4" fmla="*/ 914240 h 1828479"/>
+                <a:gd name="connsiteX0" fmla="*/ 0 w 1396998"/>
+                <a:gd name="connsiteY0" fmla="*/ 914240 h 1828480"/>
+                <a:gd name="connsiteX1" fmla="*/ 698499 w 1396998"/>
+                <a:gd name="connsiteY1" fmla="*/ 0 h 1828480"/>
+                <a:gd name="connsiteX2" fmla="*/ 1396998 w 1396998"/>
+                <a:gd name="connsiteY2" fmla="*/ 914240 h 1828480"/>
+                <a:gd name="connsiteX3" fmla="*/ 698499 w 1396998"/>
+                <a:gd name="connsiteY3" fmla="*/ 1828480 h 1828480"/>
+                <a:gd name="connsiteX4" fmla="*/ 0 w 1396998"/>
+                <a:gd name="connsiteY4" fmla="*/ 914240 h 1828480"/>
+                <a:gd name="connsiteX0" fmla="*/ 3 w 1397001"/>
+                <a:gd name="connsiteY0" fmla="*/ 337064 h 1251304"/>
+                <a:gd name="connsiteX1" fmla="*/ 702549 w 1397001"/>
+                <a:gd name="connsiteY1" fmla="*/ 44188 h 1251304"/>
+                <a:gd name="connsiteX2" fmla="*/ 1397001 w 1397001"/>
+                <a:gd name="connsiteY2" fmla="*/ 337064 h 1251304"/>
+                <a:gd name="connsiteX3" fmla="*/ 698502 w 1397001"/>
+                <a:gd name="connsiteY3" fmla="*/ 1251304 h 1251304"/>
+                <a:gd name="connsiteX4" fmla="*/ 3 w 1397001"/>
+                <a:gd name="connsiteY4" fmla="*/ 337064 h 1251304"/>
+                <a:gd name="connsiteX0" fmla="*/ 3 w 1397001"/>
+                <a:gd name="connsiteY0" fmla="*/ 335233 h 1249473"/>
+                <a:gd name="connsiteX1" fmla="*/ 702549 w 1397001"/>
+                <a:gd name="connsiteY1" fmla="*/ 42357 h 1249473"/>
+                <a:gd name="connsiteX2" fmla="*/ 1397001 w 1397001"/>
+                <a:gd name="connsiteY2" fmla="*/ 335233 h 1249473"/>
+                <a:gd name="connsiteX3" fmla="*/ 698502 w 1397001"/>
+                <a:gd name="connsiteY3" fmla="*/ 1249473 h 1249473"/>
+                <a:gd name="connsiteX4" fmla="*/ 3 w 1397001"/>
+                <a:gd name="connsiteY4" fmla="*/ 335233 h 1249473"/>
+                <a:gd name="connsiteX0" fmla="*/ 3 w 1400921"/>
+                <a:gd name="connsiteY0" fmla="*/ 366413 h 1280653"/>
+                <a:gd name="connsiteX1" fmla="*/ 702549 w 1400921"/>
+                <a:gd name="connsiteY1" fmla="*/ 73537 h 1280653"/>
+                <a:gd name="connsiteX2" fmla="*/ 1397001 w 1400921"/>
+                <a:gd name="connsiteY2" fmla="*/ 366413 h 1280653"/>
+                <a:gd name="connsiteX3" fmla="*/ 698502 w 1400921"/>
+                <a:gd name="connsiteY3" fmla="*/ 1280653 h 1280653"/>
+                <a:gd name="connsiteX4" fmla="*/ 3 w 1400921"/>
+                <a:gd name="connsiteY4" fmla="*/ 366413 h 1280653"/>
+                <a:gd name="connsiteX0" fmla="*/ 702549 w 1400921"/>
+                <a:gd name="connsiteY0" fmla="*/ 73537 h 1280653"/>
+                <a:gd name="connsiteX1" fmla="*/ 1397001 w 1400921"/>
+                <a:gd name="connsiteY1" fmla="*/ 366413 h 1280653"/>
+                <a:gd name="connsiteX2" fmla="*/ 698502 w 1400921"/>
+                <a:gd name="connsiteY2" fmla="*/ 1280653 h 1280653"/>
+                <a:gd name="connsiteX3" fmla="*/ 3 w 1400921"/>
+                <a:gd name="connsiteY3" fmla="*/ 366413 h 1280653"/>
+                <a:gd name="connsiteX4" fmla="*/ 819102 w 1400921"/>
+                <a:gd name="connsiteY4" fmla="*/ 204159 h 1280653"/>
+                <a:gd name="connsiteX0" fmla="*/ 702549 w 1400921"/>
+                <a:gd name="connsiteY0" fmla="*/ 73537 h 1280653"/>
+                <a:gd name="connsiteX1" fmla="*/ 1397001 w 1400921"/>
+                <a:gd name="connsiteY1" fmla="*/ 366413 h 1280653"/>
+                <a:gd name="connsiteX2" fmla="*/ 698502 w 1400921"/>
+                <a:gd name="connsiteY2" fmla="*/ 1280653 h 1280653"/>
+                <a:gd name="connsiteX3" fmla="*/ 3 w 1400921"/>
+                <a:gd name="connsiteY3" fmla="*/ 366413 h 1280653"/>
+                <a:gd name="connsiteX0" fmla="*/ 641843 w 1340215"/>
+                <a:gd name="connsiteY0" fmla="*/ 73537 h 1282724"/>
+                <a:gd name="connsiteX1" fmla="*/ 1336295 w 1340215"/>
+                <a:gd name="connsiteY1" fmla="*/ 366413 h 1282724"/>
+                <a:gd name="connsiteX2" fmla="*/ 637796 w 1340215"/>
+                <a:gd name="connsiteY2" fmla="*/ 1280653 h 1282724"/>
+                <a:gd name="connsiteX3" fmla="*/ 1 w 1340215"/>
+                <a:gd name="connsiteY3" fmla="*/ 148709 h 1282724"/>
+                <a:gd name="connsiteX0" fmla="*/ 675259 w 1387134"/>
+                <a:gd name="connsiteY0" fmla="*/ 73537 h 1281210"/>
+                <a:gd name="connsiteX1" fmla="*/ 1369711 w 1387134"/>
+                <a:gd name="connsiteY1" fmla="*/ 366413 h 1281210"/>
+                <a:gd name="connsiteX2" fmla="*/ 671212 w 1387134"/>
+                <a:gd name="connsiteY2" fmla="*/ 1280653 h 1281210"/>
+                <a:gd name="connsiteX3" fmla="*/ 33417 w 1387134"/>
+                <a:gd name="connsiteY3" fmla="*/ 148709 h 1281210"/>
+                <a:gd name="connsiteX0" fmla="*/ 1369711 w 1387134"/>
+                <a:gd name="connsiteY0" fmla="*/ 217704 h 1132501"/>
+                <a:gd name="connsiteX1" fmla="*/ 671212 w 1387134"/>
+                <a:gd name="connsiteY1" fmla="*/ 1131944 h 1132501"/>
+                <a:gd name="connsiteX2" fmla="*/ 33417 w 1387134"/>
+                <a:gd name="connsiteY2" fmla="*/ 0 h 1132501"/>
+                <a:gd name="connsiteX0" fmla="*/ 1239168 w 1239168"/>
+                <a:gd name="connsiteY0" fmla="*/ 22678 h 1131961"/>
+                <a:gd name="connsiteX1" fmla="*/ 637796 w 1239168"/>
+                <a:gd name="connsiteY1" fmla="*/ 1131944 h 1131961"/>
+                <a:gd name="connsiteX2" fmla="*/ 1 w 1239168"/>
+                <a:gd name="connsiteY2" fmla="*/ 0 h 1131961"/>
+                <a:gd name="connsiteX0" fmla="*/ 1293580 w 1361485"/>
+                <a:gd name="connsiteY0" fmla="*/ 22678 h 1132020"/>
+                <a:gd name="connsiteX1" fmla="*/ 692208 w 1361485"/>
+                <a:gd name="connsiteY1" fmla="*/ 1131944 h 1132020"/>
+                <a:gd name="connsiteX2" fmla="*/ 54413 w 1361485"/>
+                <a:gd name="connsiteY2" fmla="*/ 0 h 1132020"/>
+                <a:gd name="connsiteX0" fmla="*/ 1301065 w 1361145"/>
+                <a:gd name="connsiteY0" fmla="*/ 22678 h 619600"/>
+                <a:gd name="connsiteX1" fmla="*/ 679458 w 1361145"/>
+                <a:gd name="connsiteY1" fmla="*/ 619433 h 619600"/>
+                <a:gd name="connsiteX2" fmla="*/ 61898 w 1361145"/>
+                <a:gd name="connsiteY2" fmla="*/ 0 h 619600"/>
+                <a:gd name="connsiteX0" fmla="*/ 1302309 w 1363623"/>
+                <a:gd name="connsiteY0" fmla="*/ 22678 h 622076"/>
+                <a:gd name="connsiteX1" fmla="*/ 680702 w 1363623"/>
+                <a:gd name="connsiteY1" fmla="*/ 619433 h 622076"/>
+                <a:gd name="connsiteX2" fmla="*/ 63142 w 1363623"/>
+                <a:gd name="connsiteY2" fmla="*/ 0 h 622076"/>
+                <a:gd name="connsiteX0" fmla="*/ 1302309 w 1363623"/>
+                <a:gd name="connsiteY0" fmla="*/ 22678 h 620026"/>
+                <a:gd name="connsiteX1" fmla="*/ 680702 w 1363623"/>
+                <a:gd name="connsiteY1" fmla="*/ 619433 h 620026"/>
+                <a:gd name="connsiteX2" fmla="*/ 63142 w 1363623"/>
+                <a:gd name="connsiteY2" fmla="*/ 0 h 620026"/>
+                <a:gd name="connsiteX0" fmla="*/ 1293313 w 1364125"/>
+                <a:gd name="connsiteY0" fmla="*/ 22678 h 851135"/>
+                <a:gd name="connsiteX1" fmla="*/ 695988 w 1364125"/>
+                <a:gd name="connsiteY1" fmla="*/ 850744 h 851135"/>
+                <a:gd name="connsiteX2" fmla="*/ 54146 w 1364125"/>
+                <a:gd name="connsiteY2" fmla="*/ 0 h 851135"/>
+                <a:gd name="connsiteX0" fmla="*/ 1292135 w 1361653"/>
+                <a:gd name="connsiteY0" fmla="*/ 22678 h 852186"/>
+                <a:gd name="connsiteX1" fmla="*/ 694810 w 1361653"/>
+                <a:gd name="connsiteY1" fmla="*/ 850744 h 852186"/>
+                <a:gd name="connsiteX2" fmla="*/ 52968 w 1361653"/>
+                <a:gd name="connsiteY2" fmla="*/ 0 h 852186"/>
+              </a:gdLst>
+              <a:ahLst/>
+              <a:cxnLst>
+                <a:cxn ang="0">
+                  <a:pos x="connsiteX0" y="connsiteY0"/>
+                </a:cxn>
+                <a:cxn ang="0">
+                  <a:pos x="connsiteX1" y="connsiteY1"/>
+                </a:cxn>
+                <a:cxn ang="0">
+                  <a:pos x="connsiteX2" y="connsiteY2"/>
+                </a:cxn>
+              </a:cxnLst>
+              <a:rect l="l" t="t" r="r" b="b"/>
+              <a:pathLst>
+                <a:path w="1361653" h="852186">
+                  <a:moveTo>
+                    <a:pt x="1292135" y="22678"/>
+                  </a:moveTo>
+                  <a:cubicBezTo>
+                    <a:pt x="1292135" y="527599"/>
+                    <a:pt x="1662169" y="813703"/>
+                    <a:pt x="694810" y="850744"/>
+                  </a:cubicBezTo>
+                  <a:cubicBezTo>
+                    <a:pt x="-272549" y="887785"/>
+                    <a:pt x="52293" y="201186"/>
+                    <a:pt x="52968" y="0"/>
+                  </a:cubicBezTo>
+                </a:path>
+              </a:pathLst>
+            </a:custGeom>
+            <a:solidFill>
+              <a:schemeClr val="tx1"/>
+            </a:solidFill>
+            <a:ln>
+              <a:noFill/>
+            </a:ln>
+          </p:spPr>
+          <p:style>
+            <a:lnRef idx="2">
+              <a:schemeClr val="accent1">
+                <a:shade val="50000"/>
+              </a:schemeClr>
+            </a:lnRef>
+            <a:fillRef idx="1">
+              <a:schemeClr val="accent1"/>
+            </a:fillRef>
+            <a:effectRef idx="0">
+              <a:schemeClr val="accent1"/>
+            </a:effectRef>
+            <a:fontRef idx="minor">
+              <a:schemeClr val="lt1"/>
+            </a:fontRef>
+          </p:style>
+          <p:txBody>
+            <a:bodyPr rtlCol="0" anchor="ctr"/>
+            <a:lstStyle/>
+            <a:p>
+              <a:pPr algn="ctr"/>
+              <a:endParaRPr lang="en-US"/>
+            </a:p>
+          </p:txBody>
+        </p:sp>
+        <p:sp>
+          <p:nvSpPr>
+            <p:cNvPr id="5" name="Oval 1"/>
+            <p:cNvSpPr/>
+            <p:nvPr/>
+          </p:nvSpPr>
+          <p:spPr>
+            <a:xfrm>
+              <a:off x="6984797" y="1916767"/>
+              <a:ext cx="2062632" cy="1821958"/>
+            </a:xfrm>
+            <a:custGeom>
+              <a:avLst/>
+              <a:gdLst>
+                <a:gd name="connsiteX0" fmla="*/ 0 w 1396998"/>
+                <a:gd name="connsiteY0" fmla="*/ 914240 h 1828479"/>
+                <a:gd name="connsiteX1" fmla="*/ 698499 w 1396998"/>
+                <a:gd name="connsiteY1" fmla="*/ 0 h 1828479"/>
+                <a:gd name="connsiteX2" fmla="*/ 1396998 w 1396998"/>
+                <a:gd name="connsiteY2" fmla="*/ 914240 h 1828479"/>
+                <a:gd name="connsiteX3" fmla="*/ 698499 w 1396998"/>
+                <a:gd name="connsiteY3" fmla="*/ 1828480 h 1828479"/>
+                <a:gd name="connsiteX4" fmla="*/ 0 w 1396998"/>
+                <a:gd name="connsiteY4" fmla="*/ 914240 h 1828479"/>
+                <a:gd name="connsiteX0" fmla="*/ 0 w 1396998"/>
+                <a:gd name="connsiteY0" fmla="*/ 914240 h 1828480"/>
+                <a:gd name="connsiteX1" fmla="*/ 698499 w 1396998"/>
+                <a:gd name="connsiteY1" fmla="*/ 0 h 1828480"/>
+                <a:gd name="connsiteX2" fmla="*/ 1396998 w 1396998"/>
+                <a:gd name="connsiteY2" fmla="*/ 914240 h 1828480"/>
+                <a:gd name="connsiteX3" fmla="*/ 698499 w 1396998"/>
+                <a:gd name="connsiteY3" fmla="*/ 1828480 h 1828480"/>
+                <a:gd name="connsiteX4" fmla="*/ 0 w 1396998"/>
+                <a:gd name="connsiteY4" fmla="*/ 914240 h 1828480"/>
+                <a:gd name="connsiteX0" fmla="*/ 3 w 1397001"/>
+                <a:gd name="connsiteY0" fmla="*/ 337064 h 1251304"/>
+                <a:gd name="connsiteX1" fmla="*/ 702549 w 1397001"/>
+                <a:gd name="connsiteY1" fmla="*/ 44188 h 1251304"/>
+                <a:gd name="connsiteX2" fmla="*/ 1397001 w 1397001"/>
+                <a:gd name="connsiteY2" fmla="*/ 337064 h 1251304"/>
+                <a:gd name="connsiteX3" fmla="*/ 698502 w 1397001"/>
+                <a:gd name="connsiteY3" fmla="*/ 1251304 h 1251304"/>
+                <a:gd name="connsiteX4" fmla="*/ 3 w 1397001"/>
+                <a:gd name="connsiteY4" fmla="*/ 337064 h 1251304"/>
+                <a:gd name="connsiteX0" fmla="*/ 3 w 1397001"/>
+                <a:gd name="connsiteY0" fmla="*/ 335233 h 1249473"/>
+                <a:gd name="connsiteX1" fmla="*/ 702549 w 1397001"/>
+                <a:gd name="connsiteY1" fmla="*/ 42357 h 1249473"/>
+                <a:gd name="connsiteX2" fmla="*/ 1397001 w 1397001"/>
+                <a:gd name="connsiteY2" fmla="*/ 335233 h 1249473"/>
+                <a:gd name="connsiteX3" fmla="*/ 698502 w 1397001"/>
+                <a:gd name="connsiteY3" fmla="*/ 1249473 h 1249473"/>
+                <a:gd name="connsiteX4" fmla="*/ 3 w 1397001"/>
+                <a:gd name="connsiteY4" fmla="*/ 335233 h 1249473"/>
+                <a:gd name="connsiteX0" fmla="*/ 3 w 1400921"/>
+                <a:gd name="connsiteY0" fmla="*/ 366413 h 1280653"/>
+                <a:gd name="connsiteX1" fmla="*/ 702549 w 1400921"/>
+                <a:gd name="connsiteY1" fmla="*/ 73537 h 1280653"/>
+                <a:gd name="connsiteX2" fmla="*/ 1397001 w 1400921"/>
+                <a:gd name="connsiteY2" fmla="*/ 366413 h 1280653"/>
+                <a:gd name="connsiteX3" fmla="*/ 698502 w 1400921"/>
+                <a:gd name="connsiteY3" fmla="*/ 1280653 h 1280653"/>
+                <a:gd name="connsiteX4" fmla="*/ 3 w 1400921"/>
+                <a:gd name="connsiteY4" fmla="*/ 366413 h 1280653"/>
+                <a:gd name="connsiteX0" fmla="*/ 702549 w 1400921"/>
+                <a:gd name="connsiteY0" fmla="*/ 73537 h 1280653"/>
+                <a:gd name="connsiteX1" fmla="*/ 1397001 w 1400921"/>
+                <a:gd name="connsiteY1" fmla="*/ 366413 h 1280653"/>
+                <a:gd name="connsiteX2" fmla="*/ 698502 w 1400921"/>
+                <a:gd name="connsiteY2" fmla="*/ 1280653 h 1280653"/>
+                <a:gd name="connsiteX3" fmla="*/ 3 w 1400921"/>
+                <a:gd name="connsiteY3" fmla="*/ 366413 h 1280653"/>
+                <a:gd name="connsiteX4" fmla="*/ 819102 w 1400921"/>
+                <a:gd name="connsiteY4" fmla="*/ 204159 h 1280653"/>
+                <a:gd name="connsiteX0" fmla="*/ 702549 w 1400921"/>
+                <a:gd name="connsiteY0" fmla="*/ 73537 h 1280653"/>
+                <a:gd name="connsiteX1" fmla="*/ 1397001 w 1400921"/>
+                <a:gd name="connsiteY1" fmla="*/ 366413 h 1280653"/>
+                <a:gd name="connsiteX2" fmla="*/ 698502 w 1400921"/>
+                <a:gd name="connsiteY2" fmla="*/ 1280653 h 1280653"/>
+                <a:gd name="connsiteX3" fmla="*/ 3 w 1400921"/>
+                <a:gd name="connsiteY3" fmla="*/ 366413 h 1280653"/>
+                <a:gd name="connsiteX0" fmla="*/ 641843 w 1340215"/>
+                <a:gd name="connsiteY0" fmla="*/ 73537 h 1282724"/>
+                <a:gd name="connsiteX1" fmla="*/ 1336295 w 1340215"/>
+                <a:gd name="connsiteY1" fmla="*/ 366413 h 1282724"/>
+                <a:gd name="connsiteX2" fmla="*/ 637796 w 1340215"/>
+                <a:gd name="connsiteY2" fmla="*/ 1280653 h 1282724"/>
+                <a:gd name="connsiteX3" fmla="*/ 1 w 1340215"/>
+                <a:gd name="connsiteY3" fmla="*/ 148709 h 1282724"/>
+                <a:gd name="connsiteX0" fmla="*/ 675259 w 1387134"/>
+                <a:gd name="connsiteY0" fmla="*/ 73537 h 1281210"/>
+                <a:gd name="connsiteX1" fmla="*/ 1369711 w 1387134"/>
+                <a:gd name="connsiteY1" fmla="*/ 366413 h 1281210"/>
+                <a:gd name="connsiteX2" fmla="*/ 671212 w 1387134"/>
+                <a:gd name="connsiteY2" fmla="*/ 1280653 h 1281210"/>
+                <a:gd name="connsiteX3" fmla="*/ 33417 w 1387134"/>
+                <a:gd name="connsiteY3" fmla="*/ 148709 h 1281210"/>
+                <a:gd name="connsiteX0" fmla="*/ 1369711 w 1387134"/>
+                <a:gd name="connsiteY0" fmla="*/ 217704 h 1132501"/>
+                <a:gd name="connsiteX1" fmla="*/ 671212 w 1387134"/>
+                <a:gd name="connsiteY1" fmla="*/ 1131944 h 1132501"/>
+                <a:gd name="connsiteX2" fmla="*/ 33417 w 1387134"/>
+                <a:gd name="connsiteY2" fmla="*/ 0 h 1132501"/>
+                <a:gd name="connsiteX0" fmla="*/ 1239168 w 1239168"/>
+                <a:gd name="connsiteY0" fmla="*/ 22678 h 1131961"/>
+                <a:gd name="connsiteX1" fmla="*/ 637796 w 1239168"/>
+                <a:gd name="connsiteY1" fmla="*/ 1131944 h 1131961"/>
+                <a:gd name="connsiteX2" fmla="*/ 1 w 1239168"/>
+                <a:gd name="connsiteY2" fmla="*/ 0 h 1131961"/>
+                <a:gd name="connsiteX0" fmla="*/ 1293580 w 1361485"/>
+                <a:gd name="connsiteY0" fmla="*/ 22678 h 1132020"/>
+                <a:gd name="connsiteX1" fmla="*/ 692208 w 1361485"/>
+                <a:gd name="connsiteY1" fmla="*/ 1131944 h 1132020"/>
+                <a:gd name="connsiteX2" fmla="*/ 54413 w 1361485"/>
+                <a:gd name="connsiteY2" fmla="*/ 0 h 1132020"/>
+                <a:gd name="connsiteX0" fmla="*/ 1301065 w 1361145"/>
+                <a:gd name="connsiteY0" fmla="*/ 22678 h 619600"/>
+                <a:gd name="connsiteX1" fmla="*/ 679458 w 1361145"/>
+                <a:gd name="connsiteY1" fmla="*/ 619433 h 619600"/>
+                <a:gd name="connsiteX2" fmla="*/ 61898 w 1361145"/>
+                <a:gd name="connsiteY2" fmla="*/ 0 h 619600"/>
+                <a:gd name="connsiteX0" fmla="*/ 1302309 w 1363623"/>
+                <a:gd name="connsiteY0" fmla="*/ 22678 h 622076"/>
+                <a:gd name="connsiteX1" fmla="*/ 680702 w 1363623"/>
+                <a:gd name="connsiteY1" fmla="*/ 619433 h 622076"/>
+                <a:gd name="connsiteX2" fmla="*/ 63142 w 1363623"/>
+                <a:gd name="connsiteY2" fmla="*/ 0 h 622076"/>
+                <a:gd name="connsiteX0" fmla="*/ 1302309 w 1363623"/>
+                <a:gd name="connsiteY0" fmla="*/ 22678 h 620026"/>
+                <a:gd name="connsiteX1" fmla="*/ 680702 w 1363623"/>
+                <a:gd name="connsiteY1" fmla="*/ 619433 h 620026"/>
+                <a:gd name="connsiteX2" fmla="*/ 63142 w 1363623"/>
+                <a:gd name="connsiteY2" fmla="*/ 0 h 620026"/>
+                <a:gd name="connsiteX0" fmla="*/ 1293313 w 1364125"/>
+                <a:gd name="connsiteY0" fmla="*/ 22678 h 851135"/>
+                <a:gd name="connsiteX1" fmla="*/ 695988 w 1364125"/>
+                <a:gd name="connsiteY1" fmla="*/ 850744 h 851135"/>
+                <a:gd name="connsiteX2" fmla="*/ 54146 w 1364125"/>
+                <a:gd name="connsiteY2" fmla="*/ 0 h 851135"/>
+                <a:gd name="connsiteX0" fmla="*/ 1292135 w 1361653"/>
+                <a:gd name="connsiteY0" fmla="*/ 22678 h 852186"/>
+                <a:gd name="connsiteX1" fmla="*/ 694810 w 1361653"/>
+                <a:gd name="connsiteY1" fmla="*/ 850744 h 852186"/>
+                <a:gd name="connsiteX2" fmla="*/ 52968 w 1361653"/>
+                <a:gd name="connsiteY2" fmla="*/ 0 h 852186"/>
+                <a:gd name="connsiteX0" fmla="*/ 1292135 w 1361653"/>
+                <a:gd name="connsiteY0" fmla="*/ 22678 h 852186"/>
+                <a:gd name="connsiteX1" fmla="*/ 694810 w 1361653"/>
+                <a:gd name="connsiteY1" fmla="*/ 850744 h 852186"/>
+                <a:gd name="connsiteX2" fmla="*/ 52968 w 1361653"/>
+                <a:gd name="connsiteY2" fmla="*/ 0 h 852186"/>
+                <a:gd name="connsiteX3" fmla="*/ 1292135 w 1361653"/>
+                <a:gd name="connsiteY3" fmla="*/ 22678 h 852186"/>
+                <a:gd name="connsiteX0" fmla="*/ 1291494 w 1361012"/>
+                <a:gd name="connsiteY0" fmla="*/ 22678 h 852075"/>
+                <a:gd name="connsiteX1" fmla="*/ 694169 w 1361012"/>
+                <a:gd name="connsiteY1" fmla="*/ 850744 h 852075"/>
+                <a:gd name="connsiteX2" fmla="*/ 52327 w 1361012"/>
+                <a:gd name="connsiteY2" fmla="*/ 0 h 852075"/>
+                <a:gd name="connsiteX3" fmla="*/ 689312 w 1361012"/>
+                <a:gd name="connsiteY3" fmla="*/ 7368 h 852075"/>
+                <a:gd name="connsiteX4" fmla="*/ 1291494 w 1361012"/>
+                <a:gd name="connsiteY4" fmla="*/ 22678 h 852075"/>
+                <a:gd name="connsiteX0" fmla="*/ 1291203 w 1360721"/>
+                <a:gd name="connsiteY0" fmla="*/ 545964 h 1375529"/>
+                <a:gd name="connsiteX1" fmla="*/ 693878 w 1360721"/>
+                <a:gd name="connsiteY1" fmla="*/ 1374030 h 1375529"/>
+                <a:gd name="connsiteX2" fmla="*/ 52036 w 1360721"/>
+                <a:gd name="connsiteY2" fmla="*/ 523286 h 1375529"/>
+                <a:gd name="connsiteX3" fmla="*/ 684974 w 1360721"/>
+                <a:gd name="connsiteY3" fmla="*/ 0 h 1375529"/>
+                <a:gd name="connsiteX4" fmla="*/ 1291203 w 1360721"/>
+                <a:gd name="connsiteY4" fmla="*/ 545964 h 1375529"/>
+                <a:gd name="connsiteX0" fmla="*/ 1291203 w 1360721"/>
+                <a:gd name="connsiteY0" fmla="*/ 545964 h 1375530"/>
+                <a:gd name="connsiteX1" fmla="*/ 693878 w 1360721"/>
+                <a:gd name="connsiteY1" fmla="*/ 1374030 h 1375530"/>
+                <a:gd name="connsiteX2" fmla="*/ 52036 w 1360721"/>
+                <a:gd name="connsiteY2" fmla="*/ 523286 h 1375530"/>
+                <a:gd name="connsiteX3" fmla="*/ 684974 w 1360721"/>
+                <a:gd name="connsiteY3" fmla="*/ 0 h 1375530"/>
+                <a:gd name="connsiteX4" fmla="*/ 1291203 w 1360721"/>
+                <a:gd name="connsiteY4" fmla="*/ 545964 h 1375530"/>
+                <a:gd name="connsiteX0" fmla="*/ 1291203 w 1360721"/>
+                <a:gd name="connsiteY0" fmla="*/ 553512 h 1383078"/>
+                <a:gd name="connsiteX1" fmla="*/ 693878 w 1360721"/>
+                <a:gd name="connsiteY1" fmla="*/ 1381578 h 1383078"/>
+                <a:gd name="connsiteX2" fmla="*/ 52036 w 1360721"/>
+                <a:gd name="connsiteY2" fmla="*/ 530834 h 1383078"/>
+                <a:gd name="connsiteX3" fmla="*/ 684974 w 1360721"/>
+                <a:gd name="connsiteY3" fmla="*/ 7548 h 1383078"/>
+                <a:gd name="connsiteX4" fmla="*/ 1291203 w 1360721"/>
+                <a:gd name="connsiteY4" fmla="*/ 553512 h 1383078"/>
+                <a:gd name="connsiteX0" fmla="*/ 1291203 w 1360721"/>
+                <a:gd name="connsiteY0" fmla="*/ 545965 h 1375531"/>
+                <a:gd name="connsiteX1" fmla="*/ 693878 w 1360721"/>
+                <a:gd name="connsiteY1" fmla="*/ 1374031 h 1375531"/>
+                <a:gd name="connsiteX2" fmla="*/ 52036 w 1360721"/>
+                <a:gd name="connsiteY2" fmla="*/ 523287 h 1375531"/>
+                <a:gd name="connsiteX3" fmla="*/ 684974 w 1360721"/>
+                <a:gd name="connsiteY3" fmla="*/ 1 h 1375531"/>
+                <a:gd name="connsiteX4" fmla="*/ 1291203 w 1360721"/>
+                <a:gd name="connsiteY4" fmla="*/ 545965 h 1375531"/>
+                <a:gd name="connsiteX0" fmla="*/ 1291203 w 1360721"/>
+                <a:gd name="connsiteY0" fmla="*/ 545965 h 1375531"/>
+                <a:gd name="connsiteX1" fmla="*/ 693878 w 1360721"/>
+                <a:gd name="connsiteY1" fmla="*/ 1374031 h 1375531"/>
+                <a:gd name="connsiteX2" fmla="*/ 52036 w 1360721"/>
+                <a:gd name="connsiteY2" fmla="*/ 523287 h 1375531"/>
+                <a:gd name="connsiteX3" fmla="*/ 684974 w 1360721"/>
+                <a:gd name="connsiteY3" fmla="*/ 1 h 1375531"/>
+                <a:gd name="connsiteX4" fmla="*/ 1291203 w 1360721"/>
+                <a:gd name="connsiteY4" fmla="*/ 545965 h 1375531"/>
+                <a:gd name="connsiteX0" fmla="*/ 1291203 w 1360721"/>
+                <a:gd name="connsiteY0" fmla="*/ 545965 h 1375531"/>
+                <a:gd name="connsiteX1" fmla="*/ 693878 w 1360721"/>
+                <a:gd name="connsiteY1" fmla="*/ 1374031 h 1375531"/>
+                <a:gd name="connsiteX2" fmla="*/ 52036 w 1360721"/>
+                <a:gd name="connsiteY2" fmla="*/ 523287 h 1375531"/>
+                <a:gd name="connsiteX3" fmla="*/ 684974 w 1360721"/>
+                <a:gd name="connsiteY3" fmla="*/ 1 h 1375531"/>
+                <a:gd name="connsiteX4" fmla="*/ 1291203 w 1360721"/>
+                <a:gd name="connsiteY4" fmla="*/ 545965 h 1375531"/>
+                <a:gd name="connsiteX0" fmla="*/ 1284235 w 1353753"/>
+                <a:gd name="connsiteY0" fmla="*/ 545965 h 1375625"/>
+                <a:gd name="connsiteX1" fmla="*/ 686910 w 1353753"/>
+                <a:gd name="connsiteY1" fmla="*/ 1374031 h 1375625"/>
+                <a:gd name="connsiteX2" fmla="*/ 45068 w 1353753"/>
+                <a:gd name="connsiteY2" fmla="*/ 523287 h 1375625"/>
+                <a:gd name="connsiteX3" fmla="*/ 678006 w 1353753"/>
+                <a:gd name="connsiteY3" fmla="*/ 1 h 1375625"/>
+                <a:gd name="connsiteX4" fmla="*/ 1284235 w 1353753"/>
+                <a:gd name="connsiteY4" fmla="*/ 545965 h 1375625"/>
+                <a:gd name="connsiteX0" fmla="*/ 1284235 w 1389598"/>
+                <a:gd name="connsiteY0" fmla="*/ 545965 h 1375625"/>
+                <a:gd name="connsiteX1" fmla="*/ 686910 w 1389598"/>
+                <a:gd name="connsiteY1" fmla="*/ 1374031 h 1375625"/>
+                <a:gd name="connsiteX2" fmla="*/ 45068 w 1389598"/>
+                <a:gd name="connsiteY2" fmla="*/ 523287 h 1375625"/>
+                <a:gd name="connsiteX3" fmla="*/ 678006 w 1389598"/>
+                <a:gd name="connsiteY3" fmla="*/ 1 h 1375625"/>
+                <a:gd name="connsiteX4" fmla="*/ 1284235 w 1389598"/>
+                <a:gd name="connsiteY4" fmla="*/ 545965 h 1375625"/>
+              </a:gdLst>
+              <a:ahLst/>
+              <a:cxnLst>
+                <a:cxn ang="0">
+                  <a:pos x="connsiteX0" y="connsiteY0"/>
+                </a:cxn>
+                <a:cxn ang="0">
+                  <a:pos x="connsiteX1" y="connsiteY1"/>
+                </a:cxn>
+                <a:cxn ang="0">
+                  <a:pos x="connsiteX2" y="connsiteY2"/>
+                </a:cxn>
+                <a:cxn ang="0">
+                  <a:pos x="connsiteX3" y="connsiteY3"/>
+                </a:cxn>
+                <a:cxn ang="0">
+                  <a:pos x="connsiteX4" y="connsiteY4"/>
+                </a:cxn>
+              </a:cxnLst>
+              <a:rect l="l" t="t" r="r" b="b"/>
+              <a:pathLst>
+                <a:path w="1389598" h="1375625">
+                  <a:moveTo>
+                    <a:pt x="1284235" y="545965"/>
+                  </a:moveTo>
+                  <a:cubicBezTo>
+                    <a:pt x="1369221" y="1055422"/>
+                    <a:pt x="1654269" y="1336990"/>
+                    <a:pt x="686910" y="1374031"/>
+                  </a:cubicBezTo>
+                  <a:cubicBezTo>
+                    <a:pt x="-280449" y="1411072"/>
+                    <a:pt x="62740" y="793112"/>
+                    <a:pt x="45068" y="523287"/>
+                  </a:cubicBezTo>
+                  <a:cubicBezTo>
+                    <a:pt x="27396" y="253462"/>
+                    <a:pt x="366662" y="-568"/>
+                    <a:pt x="678006" y="1"/>
+                  </a:cubicBezTo>
+                  <a:cubicBezTo>
+                    <a:pt x="989350" y="570"/>
+                    <a:pt x="1199249" y="36508"/>
+                    <a:pt x="1284235" y="545965"/>
+                  </a:cubicBezTo>
+                  <a:close/>
+                </a:path>
+              </a:pathLst>
+            </a:custGeom>
+            <a:solidFill>
+              <a:schemeClr val="bg1"/>
+            </a:solidFill>
+            <a:ln>
+              <a:noFill/>
+            </a:ln>
+          </p:spPr>
+          <p:style>
+            <a:lnRef idx="2">
+              <a:schemeClr val="accent1">
+                <a:shade val="50000"/>
+              </a:schemeClr>
+            </a:lnRef>
+            <a:fillRef idx="1">
+              <a:schemeClr val="accent1"/>
+            </a:fillRef>
+            <a:effectRef idx="0">
+              <a:schemeClr val="accent1"/>
+            </a:effectRef>
+            <a:fontRef idx="minor">
+              <a:schemeClr val="lt1"/>
+            </a:fontRef>
+          </p:style>
+          <p:txBody>
+            <a:bodyPr rtlCol="0" anchor="ctr"/>
+            <a:lstStyle/>
+            <a:p>
+              <a:pPr algn="ctr"/>
+              <a:endParaRPr lang="en-US"/>
+            </a:p>
+          </p:txBody>
+        </p:sp>
+      </p:grpSp>
+      <p:sp>
+        <p:nvSpPr>
+          <p:cNvPr id="2" name="Oval 1"/>
+          <p:cNvSpPr/>
+          <p:nvPr/>
+        </p:nvSpPr>
+        <p:spPr>
+          <a:xfrm>
+            <a:off x="3078513" y="412772"/>
+            <a:ext cx="2643111" cy="3459473"/>
+          </a:xfrm>
+          <a:custGeom>
+            <a:avLst/>
+            <a:gdLst>
+              <a:gd name="connsiteX0" fmla="*/ 0 w 1396998"/>
+              <a:gd name="connsiteY0" fmla="*/ 914240 h 1828479"/>
+              <a:gd name="connsiteX1" fmla="*/ 698499 w 1396998"/>
+              <a:gd name="connsiteY1" fmla="*/ 0 h 1828479"/>
+              <a:gd name="connsiteX2" fmla="*/ 1396998 w 1396998"/>
+              <a:gd name="connsiteY2" fmla="*/ 914240 h 1828479"/>
+              <a:gd name="connsiteX3" fmla="*/ 698499 w 1396998"/>
+              <a:gd name="connsiteY3" fmla="*/ 1828480 h 1828479"/>
+              <a:gd name="connsiteX4" fmla="*/ 0 w 1396998"/>
+              <a:gd name="connsiteY4" fmla="*/ 914240 h 1828479"/>
+              <a:gd name="connsiteX0" fmla="*/ 0 w 1396998"/>
+              <a:gd name="connsiteY0" fmla="*/ 914240 h 1828480"/>
+              <a:gd name="connsiteX1" fmla="*/ 698499 w 1396998"/>
+              <a:gd name="connsiteY1" fmla="*/ 0 h 1828480"/>
+              <a:gd name="connsiteX2" fmla="*/ 1396998 w 1396998"/>
+              <a:gd name="connsiteY2" fmla="*/ 914240 h 1828480"/>
+              <a:gd name="connsiteX3" fmla="*/ 698499 w 1396998"/>
+              <a:gd name="connsiteY3" fmla="*/ 1828480 h 1828480"/>
+              <a:gd name="connsiteX4" fmla="*/ 0 w 1396998"/>
+              <a:gd name="connsiteY4" fmla="*/ 914240 h 1828480"/>
+            </a:gdLst>
+            <a:ahLst/>
+            <a:cxnLst>
+              <a:cxn ang="0">
+                <a:pos x="connsiteX0" y="connsiteY0"/>
+              </a:cxn>
+              <a:cxn ang="0">
+                <a:pos x="connsiteX1" y="connsiteY1"/>
+              </a:cxn>
+              <a:cxn ang="0">
+                <a:pos x="connsiteX2" y="connsiteY2"/>
+              </a:cxn>
+              <a:cxn ang="0">
+                <a:pos x="connsiteX3" y="connsiteY3"/>
+              </a:cxn>
+              <a:cxn ang="0">
+                <a:pos x="connsiteX4" y="connsiteY4"/>
+              </a:cxn>
+            </a:cxnLst>
+            <a:rect l="l" t="t" r="r" b="b"/>
+            <a:pathLst>
+              <a:path w="1396998" h="1828480">
+                <a:moveTo>
+                  <a:pt x="0" y="914240"/>
+                </a:moveTo>
+                <a:cubicBezTo>
+                  <a:pt x="0" y="409319"/>
+                  <a:pt x="312729" y="0"/>
+                  <a:pt x="698499" y="0"/>
+                </a:cubicBezTo>
+                <a:cubicBezTo>
+                  <a:pt x="1084269" y="0"/>
+                  <a:pt x="1396998" y="409319"/>
+                  <a:pt x="1396998" y="914240"/>
+                </a:cubicBezTo>
+                <a:cubicBezTo>
+                  <a:pt x="1396998" y="1419161"/>
+                  <a:pt x="1312869" y="1828480"/>
+                  <a:pt x="698499" y="1828480"/>
+                </a:cubicBezTo>
+                <a:cubicBezTo>
+                  <a:pt x="84129" y="1828480"/>
+                  <a:pt x="0" y="1419161"/>
+                  <a:pt x="0" y="914240"/>
+                </a:cubicBezTo>
+                <a:close/>
+              </a:path>
+            </a:pathLst>
+          </a:custGeom>
+          <a:solidFill>
+            <a:schemeClr val="bg1"/>
+          </a:solidFill>
+          <a:ln>
+            <a:noFill/>
+          </a:ln>
+        </p:spPr>
+        <p:style>
+          <a:lnRef idx="2">
+            <a:schemeClr val="accent1">
+              <a:shade val="50000"/>
+            </a:schemeClr>
+          </a:lnRef>
+          <a:fillRef idx="1">
+            <a:schemeClr val="accent1"/>
+          </a:fillRef>
+          <a:effectRef idx="0">
+            <a:schemeClr val="accent1"/>
+          </a:effectRef>
+          <a:fontRef idx="minor">
+            <a:schemeClr val="lt1"/>
+          </a:fontRef>
+        </p:style>
+        <p:txBody>
+          <a:bodyPr rtlCol="0" anchor="ctr"/>
+          <a:lstStyle/>
+          <a:p>
+            <a:pPr algn="ctr"/>
+            <a:endParaRPr lang="en-US"/>
+          </a:p>
+        </p:txBody>
+      </p:sp>
+      <p:sp>
+        <p:nvSpPr>
+          <p:cNvPr id="3" name="Freeform 2"/>
+          <p:cNvSpPr/>
+          <p:nvPr/>
+        </p:nvSpPr>
+        <p:spPr>
+          <a:xfrm>
+            <a:off x="3078513" y="3977634"/>
+            <a:ext cx="1813886" cy="2387395"/>
+          </a:xfrm>
+          <a:custGeom>
+            <a:avLst/>
+            <a:gdLst>
+              <a:gd name="connsiteX0" fmla="*/ 19050 w 939800"/>
+              <a:gd name="connsiteY0" fmla="*/ 0 h 1320800"/>
+              <a:gd name="connsiteX1" fmla="*/ 685800 w 939800"/>
+              <a:gd name="connsiteY1" fmla="*/ 501650 h 1320800"/>
+              <a:gd name="connsiteX2" fmla="*/ 793750 w 939800"/>
+              <a:gd name="connsiteY2" fmla="*/ 1123950 h 1320800"/>
+              <a:gd name="connsiteX3" fmla="*/ 939800 w 939800"/>
+              <a:gd name="connsiteY3" fmla="*/ 1130300 h 1320800"/>
+              <a:gd name="connsiteX4" fmla="*/ 882650 w 939800"/>
+              <a:gd name="connsiteY4" fmla="*/ 1320800 h 1320800"/>
+              <a:gd name="connsiteX5" fmla="*/ 622300 w 939800"/>
+              <a:gd name="connsiteY5" fmla="*/ 1225550 h 1320800"/>
+              <a:gd name="connsiteX6" fmla="*/ 723900 w 939800"/>
+              <a:gd name="connsiteY6" fmla="*/ 1117600 h 1320800"/>
+              <a:gd name="connsiteX7" fmla="*/ 527050 w 939800"/>
+              <a:gd name="connsiteY7" fmla="*/ 527050 h 1320800"/>
+              <a:gd name="connsiteX8" fmla="*/ 0 w 939800"/>
+              <a:gd name="connsiteY8" fmla="*/ 158750 h 1320800"/>
+              <a:gd name="connsiteX9" fmla="*/ 19050 w 939800"/>
+              <a:gd name="connsiteY9" fmla="*/ 0 h 1320800"/>
+              <a:gd name="connsiteX0" fmla="*/ 19050 w 939800"/>
+              <a:gd name="connsiteY0" fmla="*/ 0 h 1320800"/>
+              <a:gd name="connsiteX1" fmla="*/ 685800 w 939800"/>
+              <a:gd name="connsiteY1" fmla="*/ 501650 h 1320800"/>
+              <a:gd name="connsiteX2" fmla="*/ 793750 w 939800"/>
+              <a:gd name="connsiteY2" fmla="*/ 1123950 h 1320800"/>
+              <a:gd name="connsiteX3" fmla="*/ 939800 w 939800"/>
+              <a:gd name="connsiteY3" fmla="*/ 1130300 h 1320800"/>
+              <a:gd name="connsiteX4" fmla="*/ 882650 w 939800"/>
+              <a:gd name="connsiteY4" fmla="*/ 1320800 h 1320800"/>
+              <a:gd name="connsiteX5" fmla="*/ 622300 w 939800"/>
+              <a:gd name="connsiteY5" fmla="*/ 1225550 h 1320800"/>
+              <a:gd name="connsiteX6" fmla="*/ 723900 w 939800"/>
+              <a:gd name="connsiteY6" fmla="*/ 1117600 h 1320800"/>
+              <a:gd name="connsiteX7" fmla="*/ 527050 w 939800"/>
+              <a:gd name="connsiteY7" fmla="*/ 527050 h 1320800"/>
+              <a:gd name="connsiteX8" fmla="*/ 0 w 939800"/>
+              <a:gd name="connsiteY8" fmla="*/ 158750 h 1320800"/>
+              <a:gd name="connsiteX9" fmla="*/ 19050 w 939800"/>
+              <a:gd name="connsiteY9" fmla="*/ 0 h 1320800"/>
+              <a:gd name="connsiteX0" fmla="*/ 19050 w 959028"/>
+              <a:gd name="connsiteY0" fmla="*/ 0 h 1320800"/>
+              <a:gd name="connsiteX1" fmla="*/ 685800 w 959028"/>
+              <a:gd name="connsiteY1" fmla="*/ 501650 h 1320800"/>
+              <a:gd name="connsiteX2" fmla="*/ 793750 w 959028"/>
+              <a:gd name="connsiteY2" fmla="*/ 1123950 h 1320800"/>
+              <a:gd name="connsiteX3" fmla="*/ 939800 w 959028"/>
+              <a:gd name="connsiteY3" fmla="*/ 1130300 h 1320800"/>
+              <a:gd name="connsiteX4" fmla="*/ 882650 w 959028"/>
+              <a:gd name="connsiteY4" fmla="*/ 1320800 h 1320800"/>
+              <a:gd name="connsiteX5" fmla="*/ 622300 w 959028"/>
+              <a:gd name="connsiteY5" fmla="*/ 1225550 h 1320800"/>
+              <a:gd name="connsiteX6" fmla="*/ 723900 w 959028"/>
+              <a:gd name="connsiteY6" fmla="*/ 1117600 h 1320800"/>
+              <a:gd name="connsiteX7" fmla="*/ 527050 w 959028"/>
+              <a:gd name="connsiteY7" fmla="*/ 527050 h 1320800"/>
+              <a:gd name="connsiteX8" fmla="*/ 0 w 959028"/>
+              <a:gd name="connsiteY8" fmla="*/ 158750 h 1320800"/>
+              <a:gd name="connsiteX9" fmla="*/ 19050 w 959028"/>
+              <a:gd name="connsiteY9" fmla="*/ 0 h 1320800"/>
+              <a:gd name="connsiteX0" fmla="*/ 19050 w 951116"/>
+              <a:gd name="connsiteY0" fmla="*/ 0 h 1324372"/>
+              <a:gd name="connsiteX1" fmla="*/ 685800 w 951116"/>
+              <a:gd name="connsiteY1" fmla="*/ 501650 h 1324372"/>
+              <a:gd name="connsiteX2" fmla="*/ 793750 w 951116"/>
+              <a:gd name="connsiteY2" fmla="*/ 1123950 h 1324372"/>
+              <a:gd name="connsiteX3" fmla="*/ 939800 w 951116"/>
+              <a:gd name="connsiteY3" fmla="*/ 1130300 h 1324372"/>
+              <a:gd name="connsiteX4" fmla="*/ 882650 w 951116"/>
+              <a:gd name="connsiteY4" fmla="*/ 1320800 h 1324372"/>
+              <a:gd name="connsiteX5" fmla="*/ 622300 w 951116"/>
+              <a:gd name="connsiteY5" fmla="*/ 1225550 h 1324372"/>
+              <a:gd name="connsiteX6" fmla="*/ 723900 w 951116"/>
+              <a:gd name="connsiteY6" fmla="*/ 1117600 h 1324372"/>
+              <a:gd name="connsiteX7" fmla="*/ 527050 w 951116"/>
+              <a:gd name="connsiteY7" fmla="*/ 527050 h 1324372"/>
+              <a:gd name="connsiteX8" fmla="*/ 0 w 951116"/>
+              <a:gd name="connsiteY8" fmla="*/ 158750 h 1324372"/>
+              <a:gd name="connsiteX9" fmla="*/ 19050 w 951116"/>
+              <a:gd name="connsiteY9" fmla="*/ 0 h 1324372"/>
+              <a:gd name="connsiteX0" fmla="*/ 19050 w 951116"/>
+              <a:gd name="connsiteY0" fmla="*/ 0 h 1324372"/>
+              <a:gd name="connsiteX1" fmla="*/ 685800 w 951116"/>
+              <a:gd name="connsiteY1" fmla="*/ 501650 h 1324372"/>
+              <a:gd name="connsiteX2" fmla="*/ 793750 w 951116"/>
+              <a:gd name="connsiteY2" fmla="*/ 1123950 h 1324372"/>
+              <a:gd name="connsiteX3" fmla="*/ 939800 w 951116"/>
+              <a:gd name="connsiteY3" fmla="*/ 1130300 h 1324372"/>
+              <a:gd name="connsiteX4" fmla="*/ 882650 w 951116"/>
+              <a:gd name="connsiteY4" fmla="*/ 1320800 h 1324372"/>
+              <a:gd name="connsiteX5" fmla="*/ 622300 w 951116"/>
+              <a:gd name="connsiteY5" fmla="*/ 1225550 h 1324372"/>
+              <a:gd name="connsiteX6" fmla="*/ 723900 w 951116"/>
+              <a:gd name="connsiteY6" fmla="*/ 1117600 h 1324372"/>
+              <a:gd name="connsiteX7" fmla="*/ 527050 w 951116"/>
+              <a:gd name="connsiteY7" fmla="*/ 527050 h 1324372"/>
+              <a:gd name="connsiteX8" fmla="*/ 0 w 951116"/>
+              <a:gd name="connsiteY8" fmla="*/ 158750 h 1324372"/>
+              <a:gd name="connsiteX9" fmla="*/ 19050 w 951116"/>
+              <a:gd name="connsiteY9" fmla="*/ 0 h 1324372"/>
+              <a:gd name="connsiteX0" fmla="*/ 19050 w 951116"/>
+              <a:gd name="connsiteY0" fmla="*/ 0 h 1324372"/>
+              <a:gd name="connsiteX1" fmla="*/ 685800 w 951116"/>
+              <a:gd name="connsiteY1" fmla="*/ 501650 h 1324372"/>
+              <a:gd name="connsiteX2" fmla="*/ 793750 w 951116"/>
+              <a:gd name="connsiteY2" fmla="*/ 1123950 h 1324372"/>
+              <a:gd name="connsiteX3" fmla="*/ 939800 w 951116"/>
+              <a:gd name="connsiteY3" fmla="*/ 1130300 h 1324372"/>
+              <a:gd name="connsiteX4" fmla="*/ 882650 w 951116"/>
+              <a:gd name="connsiteY4" fmla="*/ 1320800 h 1324372"/>
+              <a:gd name="connsiteX5" fmla="*/ 622300 w 951116"/>
+              <a:gd name="connsiteY5" fmla="*/ 1225550 h 1324372"/>
+              <a:gd name="connsiteX6" fmla="*/ 723900 w 951116"/>
+              <a:gd name="connsiteY6" fmla="*/ 1117600 h 1324372"/>
+              <a:gd name="connsiteX7" fmla="*/ 527050 w 951116"/>
+              <a:gd name="connsiteY7" fmla="*/ 527050 h 1324372"/>
+              <a:gd name="connsiteX8" fmla="*/ 0 w 951116"/>
+              <a:gd name="connsiteY8" fmla="*/ 158750 h 1324372"/>
+              <a:gd name="connsiteX9" fmla="*/ 19050 w 951116"/>
+              <a:gd name="connsiteY9" fmla="*/ 0 h 1324372"/>
+              <a:gd name="connsiteX0" fmla="*/ 19050 w 941746"/>
+              <a:gd name="connsiteY0" fmla="*/ 0 h 1393451"/>
+              <a:gd name="connsiteX1" fmla="*/ 685800 w 941746"/>
+              <a:gd name="connsiteY1" fmla="*/ 501650 h 1393451"/>
+              <a:gd name="connsiteX2" fmla="*/ 793750 w 941746"/>
+              <a:gd name="connsiteY2" fmla="*/ 1123950 h 1393451"/>
+              <a:gd name="connsiteX3" fmla="*/ 939800 w 941746"/>
+              <a:gd name="connsiteY3" fmla="*/ 1130300 h 1393451"/>
+              <a:gd name="connsiteX4" fmla="*/ 844550 w 941746"/>
+              <a:gd name="connsiteY4" fmla="*/ 1390650 h 1393451"/>
+              <a:gd name="connsiteX5" fmla="*/ 622300 w 941746"/>
+              <a:gd name="connsiteY5" fmla="*/ 1225550 h 1393451"/>
+              <a:gd name="connsiteX6" fmla="*/ 723900 w 941746"/>
+              <a:gd name="connsiteY6" fmla="*/ 1117600 h 1393451"/>
+              <a:gd name="connsiteX7" fmla="*/ 527050 w 941746"/>
+              <a:gd name="connsiteY7" fmla="*/ 527050 h 1393451"/>
+              <a:gd name="connsiteX8" fmla="*/ 0 w 941746"/>
+              <a:gd name="connsiteY8" fmla="*/ 158750 h 1393451"/>
+              <a:gd name="connsiteX9" fmla="*/ 19050 w 941746"/>
+              <a:gd name="connsiteY9" fmla="*/ 0 h 1393451"/>
+              <a:gd name="connsiteX0" fmla="*/ 19050 w 942695"/>
+              <a:gd name="connsiteY0" fmla="*/ 0 h 1398213"/>
+              <a:gd name="connsiteX1" fmla="*/ 685800 w 942695"/>
+              <a:gd name="connsiteY1" fmla="*/ 501650 h 1398213"/>
+              <a:gd name="connsiteX2" fmla="*/ 793750 w 942695"/>
+              <a:gd name="connsiteY2" fmla="*/ 1123950 h 1398213"/>
+              <a:gd name="connsiteX3" fmla="*/ 939800 w 942695"/>
+              <a:gd name="connsiteY3" fmla="*/ 1130300 h 1398213"/>
+              <a:gd name="connsiteX4" fmla="*/ 844550 w 942695"/>
+              <a:gd name="connsiteY4" fmla="*/ 1390650 h 1398213"/>
+              <a:gd name="connsiteX5" fmla="*/ 622300 w 942695"/>
+              <a:gd name="connsiteY5" fmla="*/ 1225550 h 1398213"/>
+              <a:gd name="connsiteX6" fmla="*/ 723900 w 942695"/>
+              <a:gd name="connsiteY6" fmla="*/ 1117600 h 1398213"/>
+              <a:gd name="connsiteX7" fmla="*/ 527050 w 942695"/>
+              <a:gd name="connsiteY7" fmla="*/ 527050 h 1398213"/>
+              <a:gd name="connsiteX8" fmla="*/ 0 w 942695"/>
+              <a:gd name="connsiteY8" fmla="*/ 158750 h 1398213"/>
+              <a:gd name="connsiteX9" fmla="*/ 19050 w 942695"/>
+              <a:gd name="connsiteY9" fmla="*/ 0 h 1398213"/>
+              <a:gd name="connsiteX0" fmla="*/ 19050 w 942695"/>
+              <a:gd name="connsiteY0" fmla="*/ 0 h 1398213"/>
+              <a:gd name="connsiteX1" fmla="*/ 685800 w 942695"/>
+              <a:gd name="connsiteY1" fmla="*/ 501650 h 1398213"/>
+              <a:gd name="connsiteX2" fmla="*/ 793750 w 942695"/>
+              <a:gd name="connsiteY2" fmla="*/ 1123950 h 1398213"/>
+              <a:gd name="connsiteX3" fmla="*/ 939800 w 942695"/>
+              <a:gd name="connsiteY3" fmla="*/ 1130300 h 1398213"/>
+              <a:gd name="connsiteX4" fmla="*/ 844550 w 942695"/>
+              <a:gd name="connsiteY4" fmla="*/ 1390650 h 1398213"/>
+              <a:gd name="connsiteX5" fmla="*/ 622300 w 942695"/>
+              <a:gd name="connsiteY5" fmla="*/ 1225550 h 1398213"/>
+              <a:gd name="connsiteX6" fmla="*/ 723900 w 942695"/>
+              <a:gd name="connsiteY6" fmla="*/ 1117600 h 1398213"/>
+              <a:gd name="connsiteX7" fmla="*/ 527050 w 942695"/>
+              <a:gd name="connsiteY7" fmla="*/ 527050 h 1398213"/>
+              <a:gd name="connsiteX8" fmla="*/ 0 w 942695"/>
+              <a:gd name="connsiteY8" fmla="*/ 158750 h 1398213"/>
+              <a:gd name="connsiteX9" fmla="*/ 19050 w 942695"/>
+              <a:gd name="connsiteY9" fmla="*/ 0 h 1398213"/>
+              <a:gd name="connsiteX0" fmla="*/ 19050 w 942695"/>
+              <a:gd name="connsiteY0" fmla="*/ 0 h 1398213"/>
+              <a:gd name="connsiteX1" fmla="*/ 685800 w 942695"/>
+              <a:gd name="connsiteY1" fmla="*/ 501650 h 1398213"/>
+              <a:gd name="connsiteX2" fmla="*/ 793750 w 942695"/>
+              <a:gd name="connsiteY2" fmla="*/ 1123950 h 1398213"/>
+              <a:gd name="connsiteX3" fmla="*/ 939800 w 942695"/>
+              <a:gd name="connsiteY3" fmla="*/ 1130300 h 1398213"/>
+              <a:gd name="connsiteX4" fmla="*/ 844550 w 942695"/>
+              <a:gd name="connsiteY4" fmla="*/ 1390650 h 1398213"/>
+              <a:gd name="connsiteX5" fmla="*/ 622300 w 942695"/>
+              <a:gd name="connsiteY5" fmla="*/ 1225550 h 1398213"/>
+              <a:gd name="connsiteX6" fmla="*/ 723900 w 942695"/>
+              <a:gd name="connsiteY6" fmla="*/ 1117600 h 1398213"/>
+              <a:gd name="connsiteX7" fmla="*/ 527050 w 942695"/>
+              <a:gd name="connsiteY7" fmla="*/ 527050 h 1398213"/>
+              <a:gd name="connsiteX8" fmla="*/ 0 w 942695"/>
+              <a:gd name="connsiteY8" fmla="*/ 158750 h 1398213"/>
+              <a:gd name="connsiteX9" fmla="*/ 19050 w 942695"/>
+              <a:gd name="connsiteY9" fmla="*/ 0 h 1398213"/>
+              <a:gd name="connsiteX0" fmla="*/ 90488 w 1014133"/>
+              <a:gd name="connsiteY0" fmla="*/ 0 h 1398213"/>
+              <a:gd name="connsiteX1" fmla="*/ 757238 w 1014133"/>
+              <a:gd name="connsiteY1" fmla="*/ 501650 h 1398213"/>
+              <a:gd name="connsiteX2" fmla="*/ 865188 w 1014133"/>
+              <a:gd name="connsiteY2" fmla="*/ 1123950 h 1398213"/>
+              <a:gd name="connsiteX3" fmla="*/ 1011238 w 1014133"/>
+              <a:gd name="connsiteY3" fmla="*/ 1130300 h 1398213"/>
+              <a:gd name="connsiteX4" fmla="*/ 915988 w 1014133"/>
+              <a:gd name="connsiteY4" fmla="*/ 1390650 h 1398213"/>
+              <a:gd name="connsiteX5" fmla="*/ 693738 w 1014133"/>
+              <a:gd name="connsiteY5" fmla="*/ 1225550 h 1398213"/>
+              <a:gd name="connsiteX6" fmla="*/ 795338 w 1014133"/>
+              <a:gd name="connsiteY6" fmla="*/ 1117600 h 1398213"/>
+              <a:gd name="connsiteX7" fmla="*/ 598488 w 1014133"/>
+              <a:gd name="connsiteY7" fmla="*/ 527050 h 1398213"/>
+              <a:gd name="connsiteX8" fmla="*/ 0 w 1014133"/>
+              <a:gd name="connsiteY8" fmla="*/ 234950 h 1398213"/>
+              <a:gd name="connsiteX9" fmla="*/ 90488 w 1014133"/>
+              <a:gd name="connsiteY9" fmla="*/ 0 h 1398213"/>
+              <a:gd name="connsiteX0" fmla="*/ 90488 w 1014133"/>
+              <a:gd name="connsiteY0" fmla="*/ 0 h 1398213"/>
+              <a:gd name="connsiteX1" fmla="*/ 757238 w 1014133"/>
+              <a:gd name="connsiteY1" fmla="*/ 501650 h 1398213"/>
+              <a:gd name="connsiteX2" fmla="*/ 865188 w 1014133"/>
+              <a:gd name="connsiteY2" fmla="*/ 1123950 h 1398213"/>
+              <a:gd name="connsiteX3" fmla="*/ 1011238 w 1014133"/>
+              <a:gd name="connsiteY3" fmla="*/ 1130300 h 1398213"/>
+              <a:gd name="connsiteX4" fmla="*/ 915988 w 1014133"/>
+              <a:gd name="connsiteY4" fmla="*/ 1390650 h 1398213"/>
+              <a:gd name="connsiteX5" fmla="*/ 693738 w 1014133"/>
+              <a:gd name="connsiteY5" fmla="*/ 1225550 h 1398213"/>
+              <a:gd name="connsiteX6" fmla="*/ 795338 w 1014133"/>
+              <a:gd name="connsiteY6" fmla="*/ 1117600 h 1398213"/>
+              <a:gd name="connsiteX7" fmla="*/ 598488 w 1014133"/>
+              <a:gd name="connsiteY7" fmla="*/ 527050 h 1398213"/>
+              <a:gd name="connsiteX8" fmla="*/ 0 w 1014133"/>
+              <a:gd name="connsiteY8" fmla="*/ 234950 h 1398213"/>
+              <a:gd name="connsiteX9" fmla="*/ 90488 w 1014133"/>
+              <a:gd name="connsiteY9" fmla="*/ 0 h 1398213"/>
+              <a:gd name="connsiteX0" fmla="*/ 145257 w 1014133"/>
+              <a:gd name="connsiteY0" fmla="*/ 0 h 1395832"/>
+              <a:gd name="connsiteX1" fmla="*/ 757238 w 1014133"/>
+              <a:gd name="connsiteY1" fmla="*/ 499269 h 1395832"/>
+              <a:gd name="connsiteX2" fmla="*/ 865188 w 1014133"/>
+              <a:gd name="connsiteY2" fmla="*/ 1121569 h 1395832"/>
+              <a:gd name="connsiteX3" fmla="*/ 1011238 w 1014133"/>
+              <a:gd name="connsiteY3" fmla="*/ 1127919 h 1395832"/>
+              <a:gd name="connsiteX4" fmla="*/ 915988 w 1014133"/>
+              <a:gd name="connsiteY4" fmla="*/ 1388269 h 1395832"/>
+              <a:gd name="connsiteX5" fmla="*/ 693738 w 1014133"/>
+              <a:gd name="connsiteY5" fmla="*/ 1223169 h 1395832"/>
+              <a:gd name="connsiteX6" fmla="*/ 795338 w 1014133"/>
+              <a:gd name="connsiteY6" fmla="*/ 1115219 h 1395832"/>
+              <a:gd name="connsiteX7" fmla="*/ 598488 w 1014133"/>
+              <a:gd name="connsiteY7" fmla="*/ 524669 h 1395832"/>
+              <a:gd name="connsiteX8" fmla="*/ 0 w 1014133"/>
+              <a:gd name="connsiteY8" fmla="*/ 232569 h 1395832"/>
+              <a:gd name="connsiteX9" fmla="*/ 145257 w 1014133"/>
+              <a:gd name="connsiteY9" fmla="*/ 0 h 1395832"/>
+              <a:gd name="connsiteX0" fmla="*/ 145257 w 1014133"/>
+              <a:gd name="connsiteY0" fmla="*/ 0 h 1395832"/>
+              <a:gd name="connsiteX1" fmla="*/ 757238 w 1014133"/>
+              <a:gd name="connsiteY1" fmla="*/ 499269 h 1395832"/>
+              <a:gd name="connsiteX2" fmla="*/ 865188 w 1014133"/>
+              <a:gd name="connsiteY2" fmla="*/ 1121569 h 1395832"/>
+              <a:gd name="connsiteX3" fmla="*/ 1011238 w 1014133"/>
+              <a:gd name="connsiteY3" fmla="*/ 1127919 h 1395832"/>
+              <a:gd name="connsiteX4" fmla="*/ 915988 w 1014133"/>
+              <a:gd name="connsiteY4" fmla="*/ 1388269 h 1395832"/>
+              <a:gd name="connsiteX5" fmla="*/ 693738 w 1014133"/>
+              <a:gd name="connsiteY5" fmla="*/ 1223169 h 1395832"/>
+              <a:gd name="connsiteX6" fmla="*/ 795338 w 1014133"/>
+              <a:gd name="connsiteY6" fmla="*/ 1115219 h 1395832"/>
+              <a:gd name="connsiteX7" fmla="*/ 598488 w 1014133"/>
+              <a:gd name="connsiteY7" fmla="*/ 524669 h 1395832"/>
+              <a:gd name="connsiteX8" fmla="*/ 0 w 1014133"/>
+              <a:gd name="connsiteY8" fmla="*/ 232569 h 1395832"/>
+              <a:gd name="connsiteX9" fmla="*/ 145257 w 1014133"/>
+              <a:gd name="connsiteY9" fmla="*/ 0 h 1395832"/>
+              <a:gd name="connsiteX0" fmla="*/ 145257 w 1014133"/>
+              <a:gd name="connsiteY0" fmla="*/ 0 h 1395832"/>
+              <a:gd name="connsiteX1" fmla="*/ 757238 w 1014133"/>
+              <a:gd name="connsiteY1" fmla="*/ 499269 h 1395832"/>
+              <a:gd name="connsiteX2" fmla="*/ 865188 w 1014133"/>
+              <a:gd name="connsiteY2" fmla="*/ 1121569 h 1395832"/>
+              <a:gd name="connsiteX3" fmla="*/ 1011238 w 1014133"/>
+              <a:gd name="connsiteY3" fmla="*/ 1127919 h 1395832"/>
+              <a:gd name="connsiteX4" fmla="*/ 915988 w 1014133"/>
+              <a:gd name="connsiteY4" fmla="*/ 1388269 h 1395832"/>
+              <a:gd name="connsiteX5" fmla="*/ 693738 w 1014133"/>
+              <a:gd name="connsiteY5" fmla="*/ 1223169 h 1395832"/>
+              <a:gd name="connsiteX6" fmla="*/ 795338 w 1014133"/>
+              <a:gd name="connsiteY6" fmla="*/ 1115219 h 1395832"/>
+              <a:gd name="connsiteX7" fmla="*/ 598488 w 1014133"/>
+              <a:gd name="connsiteY7" fmla="*/ 603251 h 1395832"/>
+              <a:gd name="connsiteX8" fmla="*/ 0 w 1014133"/>
+              <a:gd name="connsiteY8" fmla="*/ 232569 h 1395832"/>
+              <a:gd name="connsiteX9" fmla="*/ 145257 w 1014133"/>
+              <a:gd name="connsiteY9" fmla="*/ 0 h 1395832"/>
+              <a:gd name="connsiteX0" fmla="*/ 145257 w 1012119"/>
+              <a:gd name="connsiteY0" fmla="*/ 0 h 1395832"/>
+              <a:gd name="connsiteX1" fmla="*/ 757238 w 1012119"/>
+              <a:gd name="connsiteY1" fmla="*/ 499269 h 1395832"/>
+              <a:gd name="connsiteX2" fmla="*/ 948532 w 1012119"/>
+              <a:gd name="connsiteY2" fmla="*/ 1088231 h 1395832"/>
+              <a:gd name="connsiteX3" fmla="*/ 1011238 w 1012119"/>
+              <a:gd name="connsiteY3" fmla="*/ 1127919 h 1395832"/>
+              <a:gd name="connsiteX4" fmla="*/ 915988 w 1012119"/>
+              <a:gd name="connsiteY4" fmla="*/ 1388269 h 1395832"/>
+              <a:gd name="connsiteX5" fmla="*/ 693738 w 1012119"/>
+              <a:gd name="connsiteY5" fmla="*/ 1223169 h 1395832"/>
+              <a:gd name="connsiteX6" fmla="*/ 795338 w 1012119"/>
+              <a:gd name="connsiteY6" fmla="*/ 1115219 h 1395832"/>
+              <a:gd name="connsiteX7" fmla="*/ 598488 w 1012119"/>
+              <a:gd name="connsiteY7" fmla="*/ 603251 h 1395832"/>
+              <a:gd name="connsiteX8" fmla="*/ 0 w 1012119"/>
+              <a:gd name="connsiteY8" fmla="*/ 232569 h 1395832"/>
+              <a:gd name="connsiteX9" fmla="*/ 145257 w 1012119"/>
+              <a:gd name="connsiteY9" fmla="*/ 0 h 1395832"/>
+              <a:gd name="connsiteX0" fmla="*/ 145257 w 1012119"/>
+              <a:gd name="connsiteY0" fmla="*/ 0 h 1395648"/>
+              <a:gd name="connsiteX1" fmla="*/ 757238 w 1012119"/>
+              <a:gd name="connsiteY1" fmla="*/ 499269 h 1395648"/>
+              <a:gd name="connsiteX2" fmla="*/ 948532 w 1012119"/>
+              <a:gd name="connsiteY2" fmla="*/ 1088231 h 1395648"/>
+              <a:gd name="connsiteX3" fmla="*/ 1011238 w 1012119"/>
+              <a:gd name="connsiteY3" fmla="*/ 1127919 h 1395648"/>
+              <a:gd name="connsiteX4" fmla="*/ 915988 w 1012119"/>
+              <a:gd name="connsiteY4" fmla="*/ 1388269 h 1395648"/>
+              <a:gd name="connsiteX5" fmla="*/ 693738 w 1012119"/>
+              <a:gd name="connsiteY5" fmla="*/ 1223169 h 1395648"/>
+              <a:gd name="connsiteX6" fmla="*/ 757238 w 1012119"/>
+              <a:gd name="connsiteY6" fmla="*/ 1146175 h 1395648"/>
+              <a:gd name="connsiteX7" fmla="*/ 598488 w 1012119"/>
+              <a:gd name="connsiteY7" fmla="*/ 603251 h 1395648"/>
+              <a:gd name="connsiteX8" fmla="*/ 0 w 1012119"/>
+              <a:gd name="connsiteY8" fmla="*/ 232569 h 1395648"/>
+              <a:gd name="connsiteX9" fmla="*/ 145257 w 1012119"/>
+              <a:gd name="connsiteY9" fmla="*/ 0 h 1395648"/>
+              <a:gd name="connsiteX0" fmla="*/ 145257 w 1012119"/>
+              <a:gd name="connsiteY0" fmla="*/ 0 h 1395648"/>
+              <a:gd name="connsiteX1" fmla="*/ 757238 w 1012119"/>
+              <a:gd name="connsiteY1" fmla="*/ 499269 h 1395648"/>
+              <a:gd name="connsiteX2" fmla="*/ 948532 w 1012119"/>
+              <a:gd name="connsiteY2" fmla="*/ 1088231 h 1395648"/>
+              <a:gd name="connsiteX3" fmla="*/ 1011238 w 1012119"/>
+              <a:gd name="connsiteY3" fmla="*/ 1127919 h 1395648"/>
+              <a:gd name="connsiteX4" fmla="*/ 915988 w 1012119"/>
+              <a:gd name="connsiteY4" fmla="*/ 1388269 h 1395648"/>
+              <a:gd name="connsiteX5" fmla="*/ 693738 w 1012119"/>
+              <a:gd name="connsiteY5" fmla="*/ 1223169 h 1395648"/>
+              <a:gd name="connsiteX6" fmla="*/ 757238 w 1012119"/>
+              <a:gd name="connsiteY6" fmla="*/ 1146175 h 1395648"/>
+              <a:gd name="connsiteX7" fmla="*/ 598488 w 1012119"/>
+              <a:gd name="connsiteY7" fmla="*/ 603251 h 1395648"/>
+              <a:gd name="connsiteX8" fmla="*/ 0 w 1012119"/>
+              <a:gd name="connsiteY8" fmla="*/ 232569 h 1395648"/>
+              <a:gd name="connsiteX9" fmla="*/ 145257 w 1012119"/>
+              <a:gd name="connsiteY9" fmla="*/ 0 h 1395648"/>
+              <a:gd name="connsiteX0" fmla="*/ 145257 w 1012119"/>
+              <a:gd name="connsiteY0" fmla="*/ 0 h 1400209"/>
+              <a:gd name="connsiteX1" fmla="*/ 757238 w 1012119"/>
+              <a:gd name="connsiteY1" fmla="*/ 499269 h 1400209"/>
+              <a:gd name="connsiteX2" fmla="*/ 948532 w 1012119"/>
+              <a:gd name="connsiteY2" fmla="*/ 1088231 h 1400209"/>
+              <a:gd name="connsiteX3" fmla="*/ 1011238 w 1012119"/>
+              <a:gd name="connsiteY3" fmla="*/ 1127919 h 1400209"/>
+              <a:gd name="connsiteX4" fmla="*/ 915988 w 1012119"/>
+              <a:gd name="connsiteY4" fmla="*/ 1388269 h 1400209"/>
+              <a:gd name="connsiteX5" fmla="*/ 710406 w 1012119"/>
+              <a:gd name="connsiteY5" fmla="*/ 1335088 h 1400209"/>
+              <a:gd name="connsiteX6" fmla="*/ 757238 w 1012119"/>
+              <a:gd name="connsiteY6" fmla="*/ 1146175 h 1400209"/>
+              <a:gd name="connsiteX7" fmla="*/ 598488 w 1012119"/>
+              <a:gd name="connsiteY7" fmla="*/ 603251 h 1400209"/>
+              <a:gd name="connsiteX8" fmla="*/ 0 w 1012119"/>
+              <a:gd name="connsiteY8" fmla="*/ 232569 h 1400209"/>
+              <a:gd name="connsiteX9" fmla="*/ 145257 w 1012119"/>
+              <a:gd name="connsiteY9" fmla="*/ 0 h 1400209"/>
+              <a:gd name="connsiteX0" fmla="*/ 145257 w 1012119"/>
+              <a:gd name="connsiteY0" fmla="*/ 0 h 1407350"/>
+              <a:gd name="connsiteX1" fmla="*/ 757238 w 1012119"/>
+              <a:gd name="connsiteY1" fmla="*/ 499269 h 1407350"/>
+              <a:gd name="connsiteX2" fmla="*/ 948532 w 1012119"/>
+              <a:gd name="connsiteY2" fmla="*/ 1088231 h 1407350"/>
+              <a:gd name="connsiteX3" fmla="*/ 1011238 w 1012119"/>
+              <a:gd name="connsiteY3" fmla="*/ 1127919 h 1407350"/>
+              <a:gd name="connsiteX4" fmla="*/ 915988 w 1012119"/>
+              <a:gd name="connsiteY4" fmla="*/ 1388269 h 1407350"/>
+              <a:gd name="connsiteX5" fmla="*/ 710406 w 1012119"/>
+              <a:gd name="connsiteY5" fmla="*/ 1335088 h 1407350"/>
+              <a:gd name="connsiteX6" fmla="*/ 757238 w 1012119"/>
+              <a:gd name="connsiteY6" fmla="*/ 1146175 h 1407350"/>
+              <a:gd name="connsiteX7" fmla="*/ 598488 w 1012119"/>
+              <a:gd name="connsiteY7" fmla="*/ 603251 h 1407350"/>
+              <a:gd name="connsiteX8" fmla="*/ 0 w 1012119"/>
+              <a:gd name="connsiteY8" fmla="*/ 232569 h 1407350"/>
+              <a:gd name="connsiteX9" fmla="*/ 145257 w 1012119"/>
+              <a:gd name="connsiteY9" fmla="*/ 0 h 1407350"/>
+              <a:gd name="connsiteX0" fmla="*/ 145257 w 1071035"/>
+              <a:gd name="connsiteY0" fmla="*/ 0 h 1401208"/>
+              <a:gd name="connsiteX1" fmla="*/ 757238 w 1071035"/>
+              <a:gd name="connsiteY1" fmla="*/ 499269 h 1401208"/>
+              <a:gd name="connsiteX2" fmla="*/ 948532 w 1071035"/>
+              <a:gd name="connsiteY2" fmla="*/ 1088231 h 1401208"/>
+              <a:gd name="connsiteX3" fmla="*/ 1070770 w 1071035"/>
+              <a:gd name="connsiteY3" fmla="*/ 1211263 h 1401208"/>
+              <a:gd name="connsiteX4" fmla="*/ 915988 w 1071035"/>
+              <a:gd name="connsiteY4" fmla="*/ 1388269 h 1401208"/>
+              <a:gd name="connsiteX5" fmla="*/ 710406 w 1071035"/>
+              <a:gd name="connsiteY5" fmla="*/ 1335088 h 1401208"/>
+              <a:gd name="connsiteX6" fmla="*/ 757238 w 1071035"/>
+              <a:gd name="connsiteY6" fmla="*/ 1146175 h 1401208"/>
+              <a:gd name="connsiteX7" fmla="*/ 598488 w 1071035"/>
+              <a:gd name="connsiteY7" fmla="*/ 603251 h 1401208"/>
+              <a:gd name="connsiteX8" fmla="*/ 0 w 1071035"/>
+              <a:gd name="connsiteY8" fmla="*/ 232569 h 1401208"/>
+              <a:gd name="connsiteX9" fmla="*/ 145257 w 1071035"/>
+              <a:gd name="connsiteY9" fmla="*/ 0 h 1401208"/>
+              <a:gd name="connsiteX0" fmla="*/ 145257 w 1070966"/>
+              <a:gd name="connsiteY0" fmla="*/ 0 h 1403267"/>
+              <a:gd name="connsiteX1" fmla="*/ 757238 w 1070966"/>
+              <a:gd name="connsiteY1" fmla="*/ 499269 h 1403267"/>
+              <a:gd name="connsiteX2" fmla="*/ 948532 w 1070966"/>
+              <a:gd name="connsiteY2" fmla="*/ 1088231 h 1403267"/>
+              <a:gd name="connsiteX3" fmla="*/ 1070770 w 1070966"/>
+              <a:gd name="connsiteY3" fmla="*/ 1211263 h 1403267"/>
+              <a:gd name="connsiteX4" fmla="*/ 920751 w 1070966"/>
+              <a:gd name="connsiteY4" fmla="*/ 1397794 h 1403267"/>
+              <a:gd name="connsiteX5" fmla="*/ 710406 w 1070966"/>
+              <a:gd name="connsiteY5" fmla="*/ 1335088 h 1403267"/>
+              <a:gd name="connsiteX6" fmla="*/ 757238 w 1070966"/>
+              <a:gd name="connsiteY6" fmla="*/ 1146175 h 1403267"/>
+              <a:gd name="connsiteX7" fmla="*/ 598488 w 1070966"/>
+              <a:gd name="connsiteY7" fmla="*/ 603251 h 1403267"/>
+              <a:gd name="connsiteX8" fmla="*/ 0 w 1070966"/>
+              <a:gd name="connsiteY8" fmla="*/ 232569 h 1403267"/>
+              <a:gd name="connsiteX9" fmla="*/ 145257 w 1070966"/>
+              <a:gd name="connsiteY9" fmla="*/ 0 h 1403267"/>
+              <a:gd name="connsiteX0" fmla="*/ 145257 w 1071112"/>
+              <a:gd name="connsiteY0" fmla="*/ 0 h 1409924"/>
+              <a:gd name="connsiteX1" fmla="*/ 757238 w 1071112"/>
+              <a:gd name="connsiteY1" fmla="*/ 499269 h 1409924"/>
+              <a:gd name="connsiteX2" fmla="*/ 948532 w 1071112"/>
+              <a:gd name="connsiteY2" fmla="*/ 1088231 h 1409924"/>
+              <a:gd name="connsiteX3" fmla="*/ 1070770 w 1071112"/>
+              <a:gd name="connsiteY3" fmla="*/ 1211263 h 1409924"/>
+              <a:gd name="connsiteX4" fmla="*/ 911226 w 1071112"/>
+              <a:gd name="connsiteY4" fmla="*/ 1404938 h 1409924"/>
+              <a:gd name="connsiteX5" fmla="*/ 710406 w 1071112"/>
+              <a:gd name="connsiteY5" fmla="*/ 1335088 h 1409924"/>
+              <a:gd name="connsiteX6" fmla="*/ 757238 w 1071112"/>
+              <a:gd name="connsiteY6" fmla="*/ 1146175 h 1409924"/>
+              <a:gd name="connsiteX7" fmla="*/ 598488 w 1071112"/>
+              <a:gd name="connsiteY7" fmla="*/ 603251 h 1409924"/>
+              <a:gd name="connsiteX8" fmla="*/ 0 w 1071112"/>
+              <a:gd name="connsiteY8" fmla="*/ 232569 h 1409924"/>
+              <a:gd name="connsiteX9" fmla="*/ 145257 w 1071112"/>
+              <a:gd name="connsiteY9" fmla="*/ 0 h 1409924"/>
+              <a:gd name="connsiteX0" fmla="*/ 145257 w 1071112"/>
+              <a:gd name="connsiteY0" fmla="*/ 0 h 1413400"/>
+              <a:gd name="connsiteX1" fmla="*/ 757238 w 1071112"/>
+              <a:gd name="connsiteY1" fmla="*/ 499269 h 1413400"/>
+              <a:gd name="connsiteX2" fmla="*/ 948532 w 1071112"/>
+              <a:gd name="connsiteY2" fmla="*/ 1088231 h 1413400"/>
+              <a:gd name="connsiteX3" fmla="*/ 1070770 w 1071112"/>
+              <a:gd name="connsiteY3" fmla="*/ 1211263 h 1413400"/>
+              <a:gd name="connsiteX4" fmla="*/ 911226 w 1071112"/>
+              <a:gd name="connsiteY4" fmla="*/ 1404938 h 1413400"/>
+              <a:gd name="connsiteX5" fmla="*/ 710406 w 1071112"/>
+              <a:gd name="connsiteY5" fmla="*/ 1335088 h 1413400"/>
+              <a:gd name="connsiteX6" fmla="*/ 757238 w 1071112"/>
+              <a:gd name="connsiteY6" fmla="*/ 1146175 h 1413400"/>
+              <a:gd name="connsiteX7" fmla="*/ 598488 w 1071112"/>
+              <a:gd name="connsiteY7" fmla="*/ 603251 h 1413400"/>
+              <a:gd name="connsiteX8" fmla="*/ 0 w 1071112"/>
+              <a:gd name="connsiteY8" fmla="*/ 232569 h 1413400"/>
+              <a:gd name="connsiteX9" fmla="*/ 145257 w 1071112"/>
+              <a:gd name="connsiteY9" fmla="*/ 0 h 1413400"/>
+              <a:gd name="connsiteX0" fmla="*/ 145257 w 1071112"/>
+              <a:gd name="connsiteY0" fmla="*/ 0 h 1417659"/>
+              <a:gd name="connsiteX1" fmla="*/ 757238 w 1071112"/>
+              <a:gd name="connsiteY1" fmla="*/ 499269 h 1417659"/>
+              <a:gd name="connsiteX2" fmla="*/ 948532 w 1071112"/>
+              <a:gd name="connsiteY2" fmla="*/ 1088231 h 1417659"/>
+              <a:gd name="connsiteX3" fmla="*/ 1070770 w 1071112"/>
+              <a:gd name="connsiteY3" fmla="*/ 1211263 h 1417659"/>
+              <a:gd name="connsiteX4" fmla="*/ 911226 w 1071112"/>
+              <a:gd name="connsiteY4" fmla="*/ 1404938 h 1417659"/>
+              <a:gd name="connsiteX5" fmla="*/ 710406 w 1071112"/>
+              <a:gd name="connsiteY5" fmla="*/ 1335088 h 1417659"/>
+              <a:gd name="connsiteX6" fmla="*/ 757238 w 1071112"/>
+              <a:gd name="connsiteY6" fmla="*/ 1146175 h 1417659"/>
+              <a:gd name="connsiteX7" fmla="*/ 598488 w 1071112"/>
+              <a:gd name="connsiteY7" fmla="*/ 603251 h 1417659"/>
+              <a:gd name="connsiteX8" fmla="*/ 0 w 1071112"/>
+              <a:gd name="connsiteY8" fmla="*/ 232569 h 1417659"/>
+              <a:gd name="connsiteX9" fmla="*/ 145257 w 1071112"/>
+              <a:gd name="connsiteY9" fmla="*/ 0 h 1417659"/>
+              <a:gd name="connsiteX0" fmla="*/ 145257 w 1073321"/>
+              <a:gd name="connsiteY0" fmla="*/ 0 h 1417659"/>
+              <a:gd name="connsiteX1" fmla="*/ 757238 w 1073321"/>
+              <a:gd name="connsiteY1" fmla="*/ 499269 h 1417659"/>
+              <a:gd name="connsiteX2" fmla="*/ 948532 w 1073321"/>
+              <a:gd name="connsiteY2" fmla="*/ 1088231 h 1417659"/>
+              <a:gd name="connsiteX3" fmla="*/ 1070770 w 1073321"/>
+              <a:gd name="connsiteY3" fmla="*/ 1211263 h 1417659"/>
+              <a:gd name="connsiteX4" fmla="*/ 911226 w 1073321"/>
+              <a:gd name="connsiteY4" fmla="*/ 1404938 h 1417659"/>
+              <a:gd name="connsiteX5" fmla="*/ 710406 w 1073321"/>
+              <a:gd name="connsiteY5" fmla="*/ 1335088 h 1417659"/>
+              <a:gd name="connsiteX6" fmla="*/ 757238 w 1073321"/>
+              <a:gd name="connsiteY6" fmla="*/ 1146175 h 1417659"/>
+              <a:gd name="connsiteX7" fmla="*/ 598488 w 1073321"/>
+              <a:gd name="connsiteY7" fmla="*/ 603251 h 1417659"/>
+              <a:gd name="connsiteX8" fmla="*/ 0 w 1073321"/>
+              <a:gd name="connsiteY8" fmla="*/ 232569 h 1417659"/>
+              <a:gd name="connsiteX9" fmla="*/ 145257 w 1073321"/>
+              <a:gd name="connsiteY9" fmla="*/ 0 h 1417659"/>
+              <a:gd name="connsiteX0" fmla="*/ 145257 w 1073321"/>
+              <a:gd name="connsiteY0" fmla="*/ 0 h 1417659"/>
+              <a:gd name="connsiteX1" fmla="*/ 757238 w 1073321"/>
+              <a:gd name="connsiteY1" fmla="*/ 499269 h 1417659"/>
+              <a:gd name="connsiteX2" fmla="*/ 948532 w 1073321"/>
+              <a:gd name="connsiteY2" fmla="*/ 1088231 h 1417659"/>
+              <a:gd name="connsiteX3" fmla="*/ 1070770 w 1073321"/>
+              <a:gd name="connsiteY3" fmla="*/ 1211263 h 1417659"/>
+              <a:gd name="connsiteX4" fmla="*/ 911226 w 1073321"/>
+              <a:gd name="connsiteY4" fmla="*/ 1404938 h 1417659"/>
+              <a:gd name="connsiteX5" fmla="*/ 710406 w 1073321"/>
+              <a:gd name="connsiteY5" fmla="*/ 1335088 h 1417659"/>
+              <a:gd name="connsiteX6" fmla="*/ 757238 w 1073321"/>
+              <a:gd name="connsiteY6" fmla="*/ 1146175 h 1417659"/>
+              <a:gd name="connsiteX7" fmla="*/ 598488 w 1073321"/>
+              <a:gd name="connsiteY7" fmla="*/ 603251 h 1417659"/>
+              <a:gd name="connsiteX8" fmla="*/ 0 w 1073321"/>
+              <a:gd name="connsiteY8" fmla="*/ 232569 h 1417659"/>
+              <a:gd name="connsiteX9" fmla="*/ 145257 w 1073321"/>
+              <a:gd name="connsiteY9" fmla="*/ 0 h 1417659"/>
+              <a:gd name="connsiteX0" fmla="*/ 145257 w 1073321"/>
+              <a:gd name="connsiteY0" fmla="*/ 0 h 1417659"/>
+              <a:gd name="connsiteX1" fmla="*/ 757238 w 1073321"/>
+              <a:gd name="connsiteY1" fmla="*/ 499269 h 1417659"/>
+              <a:gd name="connsiteX2" fmla="*/ 948532 w 1073321"/>
+              <a:gd name="connsiteY2" fmla="*/ 1088231 h 1417659"/>
+              <a:gd name="connsiteX3" fmla="*/ 1070770 w 1073321"/>
+              <a:gd name="connsiteY3" fmla="*/ 1211263 h 1417659"/>
+              <a:gd name="connsiteX4" fmla="*/ 911226 w 1073321"/>
+              <a:gd name="connsiteY4" fmla="*/ 1404938 h 1417659"/>
+              <a:gd name="connsiteX5" fmla="*/ 710406 w 1073321"/>
+              <a:gd name="connsiteY5" fmla="*/ 1335088 h 1417659"/>
+              <a:gd name="connsiteX6" fmla="*/ 757238 w 1073321"/>
+              <a:gd name="connsiteY6" fmla="*/ 1146175 h 1417659"/>
+              <a:gd name="connsiteX7" fmla="*/ 598488 w 1073321"/>
+              <a:gd name="connsiteY7" fmla="*/ 603251 h 1417659"/>
+              <a:gd name="connsiteX8" fmla="*/ 0 w 1073321"/>
+              <a:gd name="connsiteY8" fmla="*/ 232569 h 1417659"/>
+              <a:gd name="connsiteX9" fmla="*/ 145257 w 1073321"/>
+              <a:gd name="connsiteY9" fmla="*/ 0 h 1417659"/>
+              <a:gd name="connsiteX0" fmla="*/ 145257 w 1073321"/>
+              <a:gd name="connsiteY0" fmla="*/ 0 h 1417659"/>
+              <a:gd name="connsiteX1" fmla="*/ 757238 w 1073321"/>
+              <a:gd name="connsiteY1" fmla="*/ 499269 h 1417659"/>
+              <a:gd name="connsiteX2" fmla="*/ 948532 w 1073321"/>
+              <a:gd name="connsiteY2" fmla="*/ 1088231 h 1417659"/>
+              <a:gd name="connsiteX3" fmla="*/ 1070770 w 1073321"/>
+              <a:gd name="connsiteY3" fmla="*/ 1211263 h 1417659"/>
+              <a:gd name="connsiteX4" fmla="*/ 911226 w 1073321"/>
+              <a:gd name="connsiteY4" fmla="*/ 1404938 h 1417659"/>
+              <a:gd name="connsiteX5" fmla="*/ 710406 w 1073321"/>
+              <a:gd name="connsiteY5" fmla="*/ 1335088 h 1417659"/>
+              <a:gd name="connsiteX6" fmla="*/ 757238 w 1073321"/>
+              <a:gd name="connsiteY6" fmla="*/ 1146175 h 1417659"/>
+              <a:gd name="connsiteX7" fmla="*/ 598488 w 1073321"/>
+              <a:gd name="connsiteY7" fmla="*/ 603251 h 1417659"/>
+              <a:gd name="connsiteX8" fmla="*/ 0 w 1073321"/>
+              <a:gd name="connsiteY8" fmla="*/ 232569 h 1417659"/>
+              <a:gd name="connsiteX9" fmla="*/ 145257 w 1073321"/>
+              <a:gd name="connsiteY9" fmla="*/ 0 h 1417659"/>
+              <a:gd name="connsiteX0" fmla="*/ 145257 w 1070931"/>
+              <a:gd name="connsiteY0" fmla="*/ 0 h 1435580"/>
+              <a:gd name="connsiteX1" fmla="*/ 757238 w 1070931"/>
+              <a:gd name="connsiteY1" fmla="*/ 499269 h 1435580"/>
+              <a:gd name="connsiteX2" fmla="*/ 948532 w 1070931"/>
+              <a:gd name="connsiteY2" fmla="*/ 1088231 h 1435580"/>
+              <a:gd name="connsiteX3" fmla="*/ 1070770 w 1070931"/>
+              <a:gd name="connsiteY3" fmla="*/ 1211263 h 1435580"/>
+              <a:gd name="connsiteX4" fmla="*/ 923132 w 1070931"/>
+              <a:gd name="connsiteY4" fmla="*/ 1428750 h 1435580"/>
+              <a:gd name="connsiteX5" fmla="*/ 710406 w 1070931"/>
+              <a:gd name="connsiteY5" fmla="*/ 1335088 h 1435580"/>
+              <a:gd name="connsiteX6" fmla="*/ 757238 w 1070931"/>
+              <a:gd name="connsiteY6" fmla="*/ 1146175 h 1435580"/>
+              <a:gd name="connsiteX7" fmla="*/ 598488 w 1070931"/>
+              <a:gd name="connsiteY7" fmla="*/ 603251 h 1435580"/>
+              <a:gd name="connsiteX8" fmla="*/ 0 w 1070931"/>
+              <a:gd name="connsiteY8" fmla="*/ 232569 h 1435580"/>
+              <a:gd name="connsiteX9" fmla="*/ 145257 w 1070931"/>
+              <a:gd name="connsiteY9" fmla="*/ 0 h 1435580"/>
+              <a:gd name="connsiteX0" fmla="*/ 145257 w 1070931"/>
+              <a:gd name="connsiteY0" fmla="*/ 0 h 1429241"/>
+              <a:gd name="connsiteX1" fmla="*/ 757238 w 1070931"/>
+              <a:gd name="connsiteY1" fmla="*/ 499269 h 1429241"/>
+              <a:gd name="connsiteX2" fmla="*/ 948532 w 1070931"/>
+              <a:gd name="connsiteY2" fmla="*/ 1088231 h 1429241"/>
+              <a:gd name="connsiteX3" fmla="*/ 1070770 w 1070931"/>
+              <a:gd name="connsiteY3" fmla="*/ 1211263 h 1429241"/>
+              <a:gd name="connsiteX4" fmla="*/ 923132 w 1070931"/>
+              <a:gd name="connsiteY4" fmla="*/ 1428750 h 1429241"/>
+              <a:gd name="connsiteX5" fmla="*/ 757238 w 1070931"/>
+              <a:gd name="connsiteY5" fmla="*/ 1146175 h 1429241"/>
+              <a:gd name="connsiteX6" fmla="*/ 598488 w 1070931"/>
+              <a:gd name="connsiteY6" fmla="*/ 603251 h 1429241"/>
+              <a:gd name="connsiteX7" fmla="*/ 0 w 1070931"/>
+              <a:gd name="connsiteY7" fmla="*/ 232569 h 1429241"/>
+              <a:gd name="connsiteX8" fmla="*/ 145257 w 1070931"/>
+              <a:gd name="connsiteY8" fmla="*/ 0 h 1429241"/>
+              <a:gd name="connsiteX0" fmla="*/ 145257 w 961329"/>
+              <a:gd name="connsiteY0" fmla="*/ 0 h 1428750"/>
+              <a:gd name="connsiteX1" fmla="*/ 757238 w 961329"/>
+              <a:gd name="connsiteY1" fmla="*/ 499269 h 1428750"/>
+              <a:gd name="connsiteX2" fmla="*/ 948532 w 961329"/>
+              <a:gd name="connsiteY2" fmla="*/ 1088231 h 1428750"/>
+              <a:gd name="connsiteX3" fmla="*/ 923132 w 961329"/>
+              <a:gd name="connsiteY3" fmla="*/ 1428750 h 1428750"/>
+              <a:gd name="connsiteX4" fmla="*/ 757238 w 961329"/>
+              <a:gd name="connsiteY4" fmla="*/ 1146175 h 1428750"/>
+              <a:gd name="connsiteX5" fmla="*/ 598488 w 961329"/>
+              <a:gd name="connsiteY5" fmla="*/ 603251 h 1428750"/>
+              <a:gd name="connsiteX6" fmla="*/ 0 w 961329"/>
+              <a:gd name="connsiteY6" fmla="*/ 232569 h 1428750"/>
+              <a:gd name="connsiteX7" fmla="*/ 145257 w 961329"/>
+              <a:gd name="connsiteY7" fmla="*/ 0 h 1428750"/>
+              <a:gd name="connsiteX0" fmla="*/ 145257 w 956957"/>
+              <a:gd name="connsiteY0" fmla="*/ 0 h 1254125"/>
+              <a:gd name="connsiteX1" fmla="*/ 757238 w 956957"/>
+              <a:gd name="connsiteY1" fmla="*/ 499269 h 1254125"/>
+              <a:gd name="connsiteX2" fmla="*/ 948532 w 956957"/>
+              <a:gd name="connsiteY2" fmla="*/ 1088231 h 1254125"/>
+              <a:gd name="connsiteX3" fmla="*/ 897732 w 956957"/>
+              <a:gd name="connsiteY3" fmla="*/ 1254125 h 1254125"/>
+              <a:gd name="connsiteX4" fmla="*/ 757238 w 956957"/>
+              <a:gd name="connsiteY4" fmla="*/ 1146175 h 1254125"/>
+              <a:gd name="connsiteX5" fmla="*/ 598488 w 956957"/>
+              <a:gd name="connsiteY5" fmla="*/ 603251 h 1254125"/>
+              <a:gd name="connsiteX6" fmla="*/ 0 w 956957"/>
+              <a:gd name="connsiteY6" fmla="*/ 232569 h 1254125"/>
+              <a:gd name="connsiteX7" fmla="*/ 145257 w 956957"/>
+              <a:gd name="connsiteY7" fmla="*/ 0 h 1254125"/>
+              <a:gd name="connsiteX0" fmla="*/ 145257 w 958717"/>
+              <a:gd name="connsiteY0" fmla="*/ 0 h 1261841"/>
+              <a:gd name="connsiteX1" fmla="*/ 757238 w 958717"/>
+              <a:gd name="connsiteY1" fmla="*/ 499269 h 1261841"/>
+              <a:gd name="connsiteX2" fmla="*/ 948532 w 958717"/>
+              <a:gd name="connsiteY2" fmla="*/ 1088231 h 1261841"/>
+              <a:gd name="connsiteX3" fmla="*/ 897732 w 958717"/>
+              <a:gd name="connsiteY3" fmla="*/ 1254125 h 1261841"/>
+              <a:gd name="connsiteX4" fmla="*/ 757238 w 958717"/>
+              <a:gd name="connsiteY4" fmla="*/ 1146175 h 1261841"/>
+              <a:gd name="connsiteX5" fmla="*/ 598488 w 958717"/>
+              <a:gd name="connsiteY5" fmla="*/ 603251 h 1261841"/>
+              <a:gd name="connsiteX6" fmla="*/ 0 w 958717"/>
+              <a:gd name="connsiteY6" fmla="*/ 232569 h 1261841"/>
+              <a:gd name="connsiteX7" fmla="*/ 145257 w 958717"/>
+              <a:gd name="connsiteY7" fmla="*/ 0 h 1261841"/>
+            </a:gdLst>
+            <a:ahLst/>
+            <a:cxnLst>
+              <a:cxn ang="0">
+                <a:pos x="connsiteX0" y="connsiteY0"/>
+              </a:cxn>
+              <a:cxn ang="0">
+                <a:pos x="connsiteX1" y="connsiteY1"/>
+              </a:cxn>
+              <a:cxn ang="0">
+                <a:pos x="connsiteX2" y="connsiteY2"/>
+              </a:cxn>
+              <a:cxn ang="0">
+                <a:pos x="connsiteX3" y="connsiteY3"/>
+              </a:cxn>
+              <a:cxn ang="0">
+                <a:pos x="connsiteX4" y="connsiteY4"/>
+              </a:cxn>
+              <a:cxn ang="0">
+                <a:pos x="connsiteX5" y="connsiteY5"/>
+              </a:cxn>
+              <a:cxn ang="0">
+                <a:pos x="connsiteX6" y="connsiteY6"/>
+              </a:cxn>
+              <a:cxn ang="0">
+                <a:pos x="connsiteX7" y="connsiteY7"/>
+              </a:cxn>
+            </a:cxnLst>
+            <a:rect l="l" t="t" r="r" b="b"/>
+            <a:pathLst>
+              <a:path w="958717" h="1261841">
+                <a:moveTo>
+                  <a:pt x="145257" y="0"/>
+                </a:moveTo>
+                <a:cubicBezTo>
+                  <a:pt x="271463" y="71438"/>
+                  <a:pt x="623359" y="317897"/>
+                  <a:pt x="757238" y="499269"/>
+                </a:cubicBezTo>
+                <a:cubicBezTo>
+                  <a:pt x="891117" y="680641"/>
+                  <a:pt x="906199" y="983456"/>
+                  <a:pt x="948532" y="1088231"/>
+                </a:cubicBezTo>
+                <a:cubicBezTo>
+                  <a:pt x="976181" y="1243145"/>
+                  <a:pt x="943637" y="1242748"/>
+                  <a:pt x="897732" y="1254125"/>
+                </a:cubicBezTo>
+                <a:cubicBezTo>
+                  <a:pt x="851827" y="1265502"/>
+                  <a:pt x="811345" y="1283758"/>
+                  <a:pt x="757238" y="1146175"/>
+                </a:cubicBezTo>
+                <a:cubicBezTo>
+                  <a:pt x="727340" y="944562"/>
+                  <a:pt x="724694" y="755519"/>
+                  <a:pt x="598488" y="603251"/>
+                </a:cubicBezTo>
+                <a:cubicBezTo>
+                  <a:pt x="472282" y="450983"/>
+                  <a:pt x="148961" y="220399"/>
+                  <a:pt x="0" y="232569"/>
+                </a:cubicBezTo>
+                <a:lnTo>
+                  <a:pt x="145257" y="0"/>
+                </a:lnTo>
+                <a:close/>
+              </a:path>
+            </a:pathLst>
+          </a:custGeom>
+          <a:solidFill>
+            <a:schemeClr val="bg1"/>
+          </a:solidFill>
+          <a:ln>
+            <a:noFill/>
+          </a:ln>
+        </p:spPr>
+        <p:style>
+          <a:lnRef idx="2">
+            <a:schemeClr val="accent1">
+              <a:shade val="50000"/>
+            </a:schemeClr>
+          </a:lnRef>
+          <a:fillRef idx="1">
+            <a:schemeClr val="accent1"/>
+          </a:fillRef>
+          <a:effectRef idx="0">
+            <a:schemeClr val="accent1"/>
+          </a:effectRef>
+          <a:fontRef idx="minor">
+            <a:schemeClr val="lt1"/>
+          </a:fontRef>
+        </p:style>
+        <p:txBody>
+          <a:bodyPr rtlCol="0" anchor="ctr"/>
+          <a:lstStyle/>
+          <a:p>
+            <a:pPr algn="ctr"/>
+            <a:endParaRPr lang="en-US"/>
+          </a:p>
+        </p:txBody>
+      </p:sp>
+      <p:sp>
+        <p:nvSpPr>
+          <p:cNvPr id="7" name="Freeform 6"/>
+          <p:cNvSpPr/>
+          <p:nvPr/>
+        </p:nvSpPr>
+        <p:spPr>
+          <a:xfrm flipH="1">
+            <a:off x="5022713" y="4015704"/>
+            <a:ext cx="1711168" cy="2349325"/>
+          </a:xfrm>
+          <a:custGeom>
+            <a:avLst/>
+            <a:gdLst>
+              <a:gd name="connsiteX0" fmla="*/ 19050 w 939800"/>
+              <a:gd name="connsiteY0" fmla="*/ 0 h 1320800"/>
+              <a:gd name="connsiteX1" fmla="*/ 685800 w 939800"/>
+              <a:gd name="connsiteY1" fmla="*/ 501650 h 1320800"/>
+              <a:gd name="connsiteX2" fmla="*/ 793750 w 939800"/>
+              <a:gd name="connsiteY2" fmla="*/ 1123950 h 1320800"/>
+              <a:gd name="connsiteX3" fmla="*/ 939800 w 939800"/>
+              <a:gd name="connsiteY3" fmla="*/ 1130300 h 1320800"/>
+              <a:gd name="connsiteX4" fmla="*/ 882650 w 939800"/>
+              <a:gd name="connsiteY4" fmla="*/ 1320800 h 1320800"/>
+              <a:gd name="connsiteX5" fmla="*/ 622300 w 939800"/>
+              <a:gd name="connsiteY5" fmla="*/ 1225550 h 1320800"/>
+              <a:gd name="connsiteX6" fmla="*/ 723900 w 939800"/>
+              <a:gd name="connsiteY6" fmla="*/ 1117600 h 1320800"/>
+              <a:gd name="connsiteX7" fmla="*/ 527050 w 939800"/>
+              <a:gd name="connsiteY7" fmla="*/ 527050 h 1320800"/>
+              <a:gd name="connsiteX8" fmla="*/ 0 w 939800"/>
+              <a:gd name="connsiteY8" fmla="*/ 158750 h 1320800"/>
+              <a:gd name="connsiteX9" fmla="*/ 19050 w 939800"/>
+              <a:gd name="connsiteY9" fmla="*/ 0 h 1320800"/>
+              <a:gd name="connsiteX0" fmla="*/ 19050 w 939800"/>
+              <a:gd name="connsiteY0" fmla="*/ 0 h 1320800"/>
+              <a:gd name="connsiteX1" fmla="*/ 685800 w 939800"/>
+              <a:gd name="connsiteY1" fmla="*/ 501650 h 1320800"/>
+              <a:gd name="connsiteX2" fmla="*/ 793750 w 939800"/>
+              <a:gd name="connsiteY2" fmla="*/ 1123950 h 1320800"/>
+              <a:gd name="connsiteX3" fmla="*/ 939800 w 939800"/>
+              <a:gd name="connsiteY3" fmla="*/ 1130300 h 1320800"/>
+              <a:gd name="connsiteX4" fmla="*/ 882650 w 939800"/>
+              <a:gd name="connsiteY4" fmla="*/ 1320800 h 1320800"/>
+              <a:gd name="connsiteX5" fmla="*/ 622300 w 939800"/>
+              <a:gd name="connsiteY5" fmla="*/ 1225550 h 1320800"/>
+              <a:gd name="connsiteX6" fmla="*/ 723900 w 939800"/>
+              <a:gd name="connsiteY6" fmla="*/ 1117600 h 1320800"/>
+              <a:gd name="connsiteX7" fmla="*/ 527050 w 939800"/>
+              <a:gd name="connsiteY7" fmla="*/ 527050 h 1320800"/>
+              <a:gd name="connsiteX8" fmla="*/ 0 w 939800"/>
+              <a:gd name="connsiteY8" fmla="*/ 158750 h 1320800"/>
+              <a:gd name="connsiteX9" fmla="*/ 19050 w 939800"/>
+              <a:gd name="connsiteY9" fmla="*/ 0 h 1320800"/>
+              <a:gd name="connsiteX0" fmla="*/ 19050 w 959028"/>
+              <a:gd name="connsiteY0" fmla="*/ 0 h 1320800"/>
+              <a:gd name="connsiteX1" fmla="*/ 685800 w 959028"/>
+              <a:gd name="connsiteY1" fmla="*/ 501650 h 1320800"/>
+              <a:gd name="connsiteX2" fmla="*/ 793750 w 959028"/>
+              <a:gd name="connsiteY2" fmla="*/ 1123950 h 1320800"/>
+              <a:gd name="connsiteX3" fmla="*/ 939800 w 959028"/>
+              <a:gd name="connsiteY3" fmla="*/ 1130300 h 1320800"/>
+              <a:gd name="connsiteX4" fmla="*/ 882650 w 959028"/>
+              <a:gd name="connsiteY4" fmla="*/ 1320800 h 1320800"/>
+              <a:gd name="connsiteX5" fmla="*/ 622300 w 959028"/>
+              <a:gd name="connsiteY5" fmla="*/ 1225550 h 1320800"/>
+              <a:gd name="connsiteX6" fmla="*/ 723900 w 959028"/>
+              <a:gd name="connsiteY6" fmla="*/ 1117600 h 1320800"/>
+              <a:gd name="connsiteX7" fmla="*/ 527050 w 959028"/>
+              <a:gd name="connsiteY7" fmla="*/ 527050 h 1320800"/>
+              <a:gd name="connsiteX8" fmla="*/ 0 w 959028"/>
+              <a:gd name="connsiteY8" fmla="*/ 158750 h 1320800"/>
+              <a:gd name="connsiteX9" fmla="*/ 19050 w 959028"/>
+              <a:gd name="connsiteY9" fmla="*/ 0 h 1320800"/>
+              <a:gd name="connsiteX0" fmla="*/ 19050 w 951116"/>
+              <a:gd name="connsiteY0" fmla="*/ 0 h 1324372"/>
+              <a:gd name="connsiteX1" fmla="*/ 685800 w 951116"/>
+              <a:gd name="connsiteY1" fmla="*/ 501650 h 1324372"/>
+              <a:gd name="connsiteX2" fmla="*/ 793750 w 951116"/>
+              <a:gd name="connsiteY2" fmla="*/ 1123950 h 1324372"/>
+              <a:gd name="connsiteX3" fmla="*/ 939800 w 951116"/>
+              <a:gd name="connsiteY3" fmla="*/ 1130300 h 1324372"/>
+              <a:gd name="connsiteX4" fmla="*/ 882650 w 951116"/>
+              <a:gd name="connsiteY4" fmla="*/ 1320800 h 1324372"/>
+              <a:gd name="connsiteX5" fmla="*/ 622300 w 951116"/>
+              <a:gd name="connsiteY5" fmla="*/ 1225550 h 1324372"/>
+              <a:gd name="connsiteX6" fmla="*/ 723900 w 951116"/>
+              <a:gd name="connsiteY6" fmla="*/ 1117600 h 1324372"/>
+              <a:gd name="connsiteX7" fmla="*/ 527050 w 951116"/>
+              <a:gd name="connsiteY7" fmla="*/ 527050 h 1324372"/>
+              <a:gd name="connsiteX8" fmla="*/ 0 w 951116"/>
+              <a:gd name="connsiteY8" fmla="*/ 158750 h 1324372"/>
+              <a:gd name="connsiteX9" fmla="*/ 19050 w 951116"/>
+              <a:gd name="connsiteY9" fmla="*/ 0 h 1324372"/>
+              <a:gd name="connsiteX0" fmla="*/ 19050 w 951116"/>
+              <a:gd name="connsiteY0" fmla="*/ 0 h 1324372"/>
+              <a:gd name="connsiteX1" fmla="*/ 685800 w 951116"/>
+              <a:gd name="connsiteY1" fmla="*/ 501650 h 1324372"/>
+              <a:gd name="connsiteX2" fmla="*/ 793750 w 951116"/>
+              <a:gd name="connsiteY2" fmla="*/ 1123950 h 1324372"/>
+              <a:gd name="connsiteX3" fmla="*/ 939800 w 951116"/>
+              <a:gd name="connsiteY3" fmla="*/ 1130300 h 1324372"/>
+              <a:gd name="connsiteX4" fmla="*/ 882650 w 951116"/>
+              <a:gd name="connsiteY4" fmla="*/ 1320800 h 1324372"/>
+              <a:gd name="connsiteX5" fmla="*/ 622300 w 951116"/>
+              <a:gd name="connsiteY5" fmla="*/ 1225550 h 1324372"/>
+              <a:gd name="connsiteX6" fmla="*/ 723900 w 951116"/>
+              <a:gd name="connsiteY6" fmla="*/ 1117600 h 1324372"/>
+              <a:gd name="connsiteX7" fmla="*/ 527050 w 951116"/>
+              <a:gd name="connsiteY7" fmla="*/ 527050 h 1324372"/>
+              <a:gd name="connsiteX8" fmla="*/ 0 w 951116"/>
+              <a:gd name="connsiteY8" fmla="*/ 158750 h 1324372"/>
+              <a:gd name="connsiteX9" fmla="*/ 19050 w 951116"/>
+              <a:gd name="connsiteY9" fmla="*/ 0 h 1324372"/>
+              <a:gd name="connsiteX0" fmla="*/ 19050 w 951116"/>
+              <a:gd name="connsiteY0" fmla="*/ 0 h 1324372"/>
+              <a:gd name="connsiteX1" fmla="*/ 685800 w 951116"/>
+              <a:gd name="connsiteY1" fmla="*/ 501650 h 1324372"/>
+              <a:gd name="connsiteX2" fmla="*/ 793750 w 951116"/>
+              <a:gd name="connsiteY2" fmla="*/ 1123950 h 1324372"/>
+              <a:gd name="connsiteX3" fmla="*/ 939800 w 951116"/>
+              <a:gd name="connsiteY3" fmla="*/ 1130300 h 1324372"/>
+              <a:gd name="connsiteX4" fmla="*/ 882650 w 951116"/>
+              <a:gd name="connsiteY4" fmla="*/ 1320800 h 1324372"/>
+              <a:gd name="connsiteX5" fmla="*/ 622300 w 951116"/>
+              <a:gd name="connsiteY5" fmla="*/ 1225550 h 1324372"/>
+              <a:gd name="connsiteX6" fmla="*/ 723900 w 951116"/>
+              <a:gd name="connsiteY6" fmla="*/ 1117600 h 1324372"/>
+              <a:gd name="connsiteX7" fmla="*/ 527050 w 951116"/>
+              <a:gd name="connsiteY7" fmla="*/ 527050 h 1324372"/>
+              <a:gd name="connsiteX8" fmla="*/ 0 w 951116"/>
+              <a:gd name="connsiteY8" fmla="*/ 158750 h 1324372"/>
+              <a:gd name="connsiteX9" fmla="*/ 19050 w 951116"/>
+              <a:gd name="connsiteY9" fmla="*/ 0 h 1324372"/>
+              <a:gd name="connsiteX0" fmla="*/ 19050 w 941746"/>
+              <a:gd name="connsiteY0" fmla="*/ 0 h 1393451"/>
+              <a:gd name="connsiteX1" fmla="*/ 685800 w 941746"/>
+              <a:gd name="connsiteY1" fmla="*/ 501650 h 1393451"/>
+              <a:gd name="connsiteX2" fmla="*/ 793750 w 941746"/>
+              <a:gd name="connsiteY2" fmla="*/ 1123950 h 1393451"/>
+              <a:gd name="connsiteX3" fmla="*/ 939800 w 941746"/>
+              <a:gd name="connsiteY3" fmla="*/ 1130300 h 1393451"/>
+              <a:gd name="connsiteX4" fmla="*/ 844550 w 941746"/>
+              <a:gd name="connsiteY4" fmla="*/ 1390650 h 1393451"/>
+              <a:gd name="connsiteX5" fmla="*/ 622300 w 941746"/>
+              <a:gd name="connsiteY5" fmla="*/ 1225550 h 1393451"/>
+              <a:gd name="connsiteX6" fmla="*/ 723900 w 941746"/>
+              <a:gd name="connsiteY6" fmla="*/ 1117600 h 1393451"/>
+              <a:gd name="connsiteX7" fmla="*/ 527050 w 941746"/>
+              <a:gd name="connsiteY7" fmla="*/ 527050 h 1393451"/>
+              <a:gd name="connsiteX8" fmla="*/ 0 w 941746"/>
+              <a:gd name="connsiteY8" fmla="*/ 158750 h 1393451"/>
+              <a:gd name="connsiteX9" fmla="*/ 19050 w 941746"/>
+              <a:gd name="connsiteY9" fmla="*/ 0 h 1393451"/>
+              <a:gd name="connsiteX0" fmla="*/ 19050 w 942695"/>
+              <a:gd name="connsiteY0" fmla="*/ 0 h 1398213"/>
+              <a:gd name="connsiteX1" fmla="*/ 685800 w 942695"/>
+              <a:gd name="connsiteY1" fmla="*/ 501650 h 1398213"/>
+              <a:gd name="connsiteX2" fmla="*/ 793750 w 942695"/>
+              <a:gd name="connsiteY2" fmla="*/ 1123950 h 1398213"/>
+              <a:gd name="connsiteX3" fmla="*/ 939800 w 942695"/>
+              <a:gd name="connsiteY3" fmla="*/ 1130300 h 1398213"/>
+              <a:gd name="connsiteX4" fmla="*/ 844550 w 942695"/>
+              <a:gd name="connsiteY4" fmla="*/ 1390650 h 1398213"/>
+              <a:gd name="connsiteX5" fmla="*/ 622300 w 942695"/>
+              <a:gd name="connsiteY5" fmla="*/ 1225550 h 1398213"/>
+              <a:gd name="connsiteX6" fmla="*/ 723900 w 942695"/>
+              <a:gd name="connsiteY6" fmla="*/ 1117600 h 1398213"/>
+              <a:gd name="connsiteX7" fmla="*/ 527050 w 942695"/>
+              <a:gd name="connsiteY7" fmla="*/ 527050 h 1398213"/>
+              <a:gd name="connsiteX8" fmla="*/ 0 w 942695"/>
+              <a:gd name="connsiteY8" fmla="*/ 158750 h 1398213"/>
+              <a:gd name="connsiteX9" fmla="*/ 19050 w 942695"/>
+              <a:gd name="connsiteY9" fmla="*/ 0 h 1398213"/>
+              <a:gd name="connsiteX0" fmla="*/ 19050 w 942695"/>
+              <a:gd name="connsiteY0" fmla="*/ 0 h 1398213"/>
+              <a:gd name="connsiteX1" fmla="*/ 685800 w 942695"/>
+              <a:gd name="connsiteY1" fmla="*/ 501650 h 1398213"/>
+              <a:gd name="connsiteX2" fmla="*/ 793750 w 942695"/>
+              <a:gd name="connsiteY2" fmla="*/ 1123950 h 1398213"/>
+              <a:gd name="connsiteX3" fmla="*/ 939800 w 942695"/>
+              <a:gd name="connsiteY3" fmla="*/ 1130300 h 1398213"/>
+              <a:gd name="connsiteX4" fmla="*/ 844550 w 942695"/>
+              <a:gd name="connsiteY4" fmla="*/ 1390650 h 1398213"/>
+              <a:gd name="connsiteX5" fmla="*/ 622300 w 942695"/>
+              <a:gd name="connsiteY5" fmla="*/ 1225550 h 1398213"/>
+              <a:gd name="connsiteX6" fmla="*/ 723900 w 942695"/>
+              <a:gd name="connsiteY6" fmla="*/ 1117600 h 1398213"/>
+              <a:gd name="connsiteX7" fmla="*/ 527050 w 942695"/>
+              <a:gd name="connsiteY7" fmla="*/ 527050 h 1398213"/>
+              <a:gd name="connsiteX8" fmla="*/ 0 w 942695"/>
+              <a:gd name="connsiteY8" fmla="*/ 158750 h 1398213"/>
+              <a:gd name="connsiteX9" fmla="*/ 19050 w 942695"/>
+              <a:gd name="connsiteY9" fmla="*/ 0 h 1398213"/>
+              <a:gd name="connsiteX0" fmla="*/ 19050 w 942695"/>
+              <a:gd name="connsiteY0" fmla="*/ 0 h 1398213"/>
+              <a:gd name="connsiteX1" fmla="*/ 685800 w 942695"/>
+              <a:gd name="connsiteY1" fmla="*/ 501650 h 1398213"/>
+              <a:gd name="connsiteX2" fmla="*/ 793750 w 942695"/>
+              <a:gd name="connsiteY2" fmla="*/ 1123950 h 1398213"/>
+              <a:gd name="connsiteX3" fmla="*/ 939800 w 942695"/>
+              <a:gd name="connsiteY3" fmla="*/ 1130300 h 1398213"/>
+              <a:gd name="connsiteX4" fmla="*/ 844550 w 942695"/>
+              <a:gd name="connsiteY4" fmla="*/ 1390650 h 1398213"/>
+              <a:gd name="connsiteX5" fmla="*/ 622300 w 942695"/>
+              <a:gd name="connsiteY5" fmla="*/ 1225550 h 1398213"/>
+              <a:gd name="connsiteX6" fmla="*/ 723900 w 942695"/>
+              <a:gd name="connsiteY6" fmla="*/ 1117600 h 1398213"/>
+              <a:gd name="connsiteX7" fmla="*/ 527050 w 942695"/>
+              <a:gd name="connsiteY7" fmla="*/ 527050 h 1398213"/>
+              <a:gd name="connsiteX8" fmla="*/ 0 w 942695"/>
+              <a:gd name="connsiteY8" fmla="*/ 158750 h 1398213"/>
+              <a:gd name="connsiteX9" fmla="*/ 19050 w 942695"/>
+              <a:gd name="connsiteY9" fmla="*/ 0 h 1398213"/>
+              <a:gd name="connsiteX0" fmla="*/ 90488 w 1014133"/>
+              <a:gd name="connsiteY0" fmla="*/ 0 h 1398213"/>
+              <a:gd name="connsiteX1" fmla="*/ 757238 w 1014133"/>
+              <a:gd name="connsiteY1" fmla="*/ 501650 h 1398213"/>
+              <a:gd name="connsiteX2" fmla="*/ 865188 w 1014133"/>
+              <a:gd name="connsiteY2" fmla="*/ 1123950 h 1398213"/>
+              <a:gd name="connsiteX3" fmla="*/ 1011238 w 1014133"/>
+              <a:gd name="connsiteY3" fmla="*/ 1130300 h 1398213"/>
+              <a:gd name="connsiteX4" fmla="*/ 915988 w 1014133"/>
+              <a:gd name="connsiteY4" fmla="*/ 1390650 h 1398213"/>
+              <a:gd name="connsiteX5" fmla="*/ 693738 w 1014133"/>
+              <a:gd name="connsiteY5" fmla="*/ 1225550 h 1398213"/>
+              <a:gd name="connsiteX6" fmla="*/ 795338 w 1014133"/>
+              <a:gd name="connsiteY6" fmla="*/ 1117600 h 1398213"/>
+              <a:gd name="connsiteX7" fmla="*/ 598488 w 1014133"/>
+              <a:gd name="connsiteY7" fmla="*/ 527050 h 1398213"/>
+              <a:gd name="connsiteX8" fmla="*/ 0 w 1014133"/>
+              <a:gd name="connsiteY8" fmla="*/ 234950 h 1398213"/>
+              <a:gd name="connsiteX9" fmla="*/ 90488 w 1014133"/>
+              <a:gd name="connsiteY9" fmla="*/ 0 h 1398213"/>
+              <a:gd name="connsiteX0" fmla="*/ 90488 w 1014133"/>
+              <a:gd name="connsiteY0" fmla="*/ 0 h 1398213"/>
+              <a:gd name="connsiteX1" fmla="*/ 757238 w 1014133"/>
+              <a:gd name="connsiteY1" fmla="*/ 501650 h 1398213"/>
+              <a:gd name="connsiteX2" fmla="*/ 865188 w 1014133"/>
+              <a:gd name="connsiteY2" fmla="*/ 1123950 h 1398213"/>
+              <a:gd name="connsiteX3" fmla="*/ 1011238 w 1014133"/>
+              <a:gd name="connsiteY3" fmla="*/ 1130300 h 1398213"/>
+              <a:gd name="connsiteX4" fmla="*/ 915988 w 1014133"/>
+              <a:gd name="connsiteY4" fmla="*/ 1390650 h 1398213"/>
+              <a:gd name="connsiteX5" fmla="*/ 693738 w 1014133"/>
+              <a:gd name="connsiteY5" fmla="*/ 1225550 h 1398213"/>
+              <a:gd name="connsiteX6" fmla="*/ 795338 w 1014133"/>
+              <a:gd name="connsiteY6" fmla="*/ 1117600 h 1398213"/>
+              <a:gd name="connsiteX7" fmla="*/ 598488 w 1014133"/>
+              <a:gd name="connsiteY7" fmla="*/ 527050 h 1398213"/>
+              <a:gd name="connsiteX8" fmla="*/ 0 w 1014133"/>
+              <a:gd name="connsiteY8" fmla="*/ 234950 h 1398213"/>
+              <a:gd name="connsiteX9" fmla="*/ 90488 w 1014133"/>
+              <a:gd name="connsiteY9" fmla="*/ 0 h 1398213"/>
+              <a:gd name="connsiteX0" fmla="*/ 145257 w 1014133"/>
+              <a:gd name="connsiteY0" fmla="*/ 0 h 1395832"/>
+              <a:gd name="connsiteX1" fmla="*/ 757238 w 1014133"/>
+              <a:gd name="connsiteY1" fmla="*/ 499269 h 1395832"/>
+              <a:gd name="connsiteX2" fmla="*/ 865188 w 1014133"/>
+              <a:gd name="connsiteY2" fmla="*/ 1121569 h 1395832"/>
+              <a:gd name="connsiteX3" fmla="*/ 1011238 w 1014133"/>
+              <a:gd name="connsiteY3" fmla="*/ 1127919 h 1395832"/>
+              <a:gd name="connsiteX4" fmla="*/ 915988 w 1014133"/>
+              <a:gd name="connsiteY4" fmla="*/ 1388269 h 1395832"/>
+              <a:gd name="connsiteX5" fmla="*/ 693738 w 1014133"/>
+              <a:gd name="connsiteY5" fmla="*/ 1223169 h 1395832"/>
+              <a:gd name="connsiteX6" fmla="*/ 795338 w 1014133"/>
+              <a:gd name="connsiteY6" fmla="*/ 1115219 h 1395832"/>
+              <a:gd name="connsiteX7" fmla="*/ 598488 w 1014133"/>
+              <a:gd name="connsiteY7" fmla="*/ 524669 h 1395832"/>
+              <a:gd name="connsiteX8" fmla="*/ 0 w 1014133"/>
+              <a:gd name="connsiteY8" fmla="*/ 232569 h 1395832"/>
+              <a:gd name="connsiteX9" fmla="*/ 145257 w 1014133"/>
+              <a:gd name="connsiteY9" fmla="*/ 0 h 1395832"/>
+              <a:gd name="connsiteX0" fmla="*/ 145257 w 1014133"/>
+              <a:gd name="connsiteY0" fmla="*/ 0 h 1395832"/>
+              <a:gd name="connsiteX1" fmla="*/ 757238 w 1014133"/>
+              <a:gd name="connsiteY1" fmla="*/ 499269 h 1395832"/>
+              <a:gd name="connsiteX2" fmla="*/ 865188 w 1014133"/>
+              <a:gd name="connsiteY2" fmla="*/ 1121569 h 1395832"/>
+              <a:gd name="connsiteX3" fmla="*/ 1011238 w 1014133"/>
+              <a:gd name="connsiteY3" fmla="*/ 1127919 h 1395832"/>
+              <a:gd name="connsiteX4" fmla="*/ 915988 w 1014133"/>
+              <a:gd name="connsiteY4" fmla="*/ 1388269 h 1395832"/>
+              <a:gd name="connsiteX5" fmla="*/ 693738 w 1014133"/>
+              <a:gd name="connsiteY5" fmla="*/ 1223169 h 1395832"/>
+              <a:gd name="connsiteX6" fmla="*/ 795338 w 1014133"/>
+              <a:gd name="connsiteY6" fmla="*/ 1115219 h 1395832"/>
+              <a:gd name="connsiteX7" fmla="*/ 598488 w 1014133"/>
+              <a:gd name="connsiteY7" fmla="*/ 524669 h 1395832"/>
+              <a:gd name="connsiteX8" fmla="*/ 0 w 1014133"/>
+              <a:gd name="connsiteY8" fmla="*/ 232569 h 1395832"/>
+              <a:gd name="connsiteX9" fmla="*/ 145257 w 1014133"/>
+              <a:gd name="connsiteY9" fmla="*/ 0 h 1395832"/>
+              <a:gd name="connsiteX0" fmla="*/ 145257 w 1014133"/>
+              <a:gd name="connsiteY0" fmla="*/ 0 h 1395832"/>
+              <a:gd name="connsiteX1" fmla="*/ 757238 w 1014133"/>
+              <a:gd name="connsiteY1" fmla="*/ 499269 h 1395832"/>
+              <a:gd name="connsiteX2" fmla="*/ 865188 w 1014133"/>
+              <a:gd name="connsiteY2" fmla="*/ 1121569 h 1395832"/>
+              <a:gd name="connsiteX3" fmla="*/ 1011238 w 1014133"/>
+              <a:gd name="connsiteY3" fmla="*/ 1127919 h 1395832"/>
+              <a:gd name="connsiteX4" fmla="*/ 915988 w 1014133"/>
+              <a:gd name="connsiteY4" fmla="*/ 1388269 h 1395832"/>
+              <a:gd name="connsiteX5" fmla="*/ 693738 w 1014133"/>
+              <a:gd name="connsiteY5" fmla="*/ 1223169 h 1395832"/>
+              <a:gd name="connsiteX6" fmla="*/ 795338 w 1014133"/>
+              <a:gd name="connsiteY6" fmla="*/ 1115219 h 1395832"/>
+              <a:gd name="connsiteX7" fmla="*/ 598488 w 1014133"/>
+              <a:gd name="connsiteY7" fmla="*/ 603251 h 1395832"/>
+              <a:gd name="connsiteX8" fmla="*/ 0 w 1014133"/>
+              <a:gd name="connsiteY8" fmla="*/ 232569 h 1395832"/>
+              <a:gd name="connsiteX9" fmla="*/ 145257 w 1014133"/>
+              <a:gd name="connsiteY9" fmla="*/ 0 h 1395832"/>
+              <a:gd name="connsiteX0" fmla="*/ 145257 w 1012119"/>
+              <a:gd name="connsiteY0" fmla="*/ 0 h 1395832"/>
+              <a:gd name="connsiteX1" fmla="*/ 757238 w 1012119"/>
+              <a:gd name="connsiteY1" fmla="*/ 499269 h 1395832"/>
+              <a:gd name="connsiteX2" fmla="*/ 948532 w 1012119"/>
+              <a:gd name="connsiteY2" fmla="*/ 1088231 h 1395832"/>
+              <a:gd name="connsiteX3" fmla="*/ 1011238 w 1012119"/>
+              <a:gd name="connsiteY3" fmla="*/ 1127919 h 1395832"/>
+              <a:gd name="connsiteX4" fmla="*/ 915988 w 1012119"/>
+              <a:gd name="connsiteY4" fmla="*/ 1388269 h 1395832"/>
+              <a:gd name="connsiteX5" fmla="*/ 693738 w 1012119"/>
+              <a:gd name="connsiteY5" fmla="*/ 1223169 h 1395832"/>
+              <a:gd name="connsiteX6" fmla="*/ 795338 w 1012119"/>
+              <a:gd name="connsiteY6" fmla="*/ 1115219 h 1395832"/>
+              <a:gd name="connsiteX7" fmla="*/ 598488 w 1012119"/>
+              <a:gd name="connsiteY7" fmla="*/ 603251 h 1395832"/>
+              <a:gd name="connsiteX8" fmla="*/ 0 w 1012119"/>
+              <a:gd name="connsiteY8" fmla="*/ 232569 h 1395832"/>
+              <a:gd name="connsiteX9" fmla="*/ 145257 w 1012119"/>
+              <a:gd name="connsiteY9" fmla="*/ 0 h 1395832"/>
+              <a:gd name="connsiteX0" fmla="*/ 145257 w 1012119"/>
+              <a:gd name="connsiteY0" fmla="*/ 0 h 1395648"/>
+              <a:gd name="connsiteX1" fmla="*/ 757238 w 1012119"/>
+              <a:gd name="connsiteY1" fmla="*/ 499269 h 1395648"/>
+              <a:gd name="connsiteX2" fmla="*/ 948532 w 1012119"/>
+              <a:gd name="connsiteY2" fmla="*/ 1088231 h 1395648"/>
+              <a:gd name="connsiteX3" fmla="*/ 1011238 w 1012119"/>
+              <a:gd name="connsiteY3" fmla="*/ 1127919 h 1395648"/>
+              <a:gd name="connsiteX4" fmla="*/ 915988 w 1012119"/>
+              <a:gd name="connsiteY4" fmla="*/ 1388269 h 1395648"/>
+              <a:gd name="connsiteX5" fmla="*/ 693738 w 1012119"/>
+              <a:gd name="connsiteY5" fmla="*/ 1223169 h 1395648"/>
+              <a:gd name="connsiteX6" fmla="*/ 757238 w 1012119"/>
+              <a:gd name="connsiteY6" fmla="*/ 1146175 h 1395648"/>
+              <a:gd name="connsiteX7" fmla="*/ 598488 w 1012119"/>
+              <a:gd name="connsiteY7" fmla="*/ 603251 h 1395648"/>
+              <a:gd name="connsiteX8" fmla="*/ 0 w 1012119"/>
+              <a:gd name="connsiteY8" fmla="*/ 232569 h 1395648"/>
+              <a:gd name="connsiteX9" fmla="*/ 145257 w 1012119"/>
+              <a:gd name="connsiteY9" fmla="*/ 0 h 1395648"/>
+              <a:gd name="connsiteX0" fmla="*/ 145257 w 1012119"/>
+              <a:gd name="connsiteY0" fmla="*/ 0 h 1395648"/>
+              <a:gd name="connsiteX1" fmla="*/ 757238 w 1012119"/>
+              <a:gd name="connsiteY1" fmla="*/ 499269 h 1395648"/>
+              <a:gd name="connsiteX2" fmla="*/ 948532 w 1012119"/>
+              <a:gd name="connsiteY2" fmla="*/ 1088231 h 1395648"/>
+              <a:gd name="connsiteX3" fmla="*/ 1011238 w 1012119"/>
+              <a:gd name="connsiteY3" fmla="*/ 1127919 h 1395648"/>
+              <a:gd name="connsiteX4" fmla="*/ 915988 w 1012119"/>
+              <a:gd name="connsiteY4" fmla="*/ 1388269 h 1395648"/>
+              <a:gd name="connsiteX5" fmla="*/ 693738 w 1012119"/>
+              <a:gd name="connsiteY5" fmla="*/ 1223169 h 1395648"/>
+              <a:gd name="connsiteX6" fmla="*/ 757238 w 1012119"/>
+              <a:gd name="connsiteY6" fmla="*/ 1146175 h 1395648"/>
+              <a:gd name="connsiteX7" fmla="*/ 598488 w 1012119"/>
+              <a:gd name="connsiteY7" fmla="*/ 603251 h 1395648"/>
+              <a:gd name="connsiteX8" fmla="*/ 0 w 1012119"/>
+              <a:gd name="connsiteY8" fmla="*/ 232569 h 1395648"/>
+              <a:gd name="connsiteX9" fmla="*/ 145257 w 1012119"/>
+              <a:gd name="connsiteY9" fmla="*/ 0 h 1395648"/>
+              <a:gd name="connsiteX0" fmla="*/ 145257 w 1012119"/>
+              <a:gd name="connsiteY0" fmla="*/ 0 h 1400209"/>
+              <a:gd name="connsiteX1" fmla="*/ 757238 w 1012119"/>
+              <a:gd name="connsiteY1" fmla="*/ 499269 h 1400209"/>
+              <a:gd name="connsiteX2" fmla="*/ 948532 w 1012119"/>
+              <a:gd name="connsiteY2" fmla="*/ 1088231 h 1400209"/>
+              <a:gd name="connsiteX3" fmla="*/ 1011238 w 1012119"/>
+              <a:gd name="connsiteY3" fmla="*/ 1127919 h 1400209"/>
+              <a:gd name="connsiteX4" fmla="*/ 915988 w 1012119"/>
+              <a:gd name="connsiteY4" fmla="*/ 1388269 h 1400209"/>
+              <a:gd name="connsiteX5" fmla="*/ 710406 w 1012119"/>
+              <a:gd name="connsiteY5" fmla="*/ 1335088 h 1400209"/>
+              <a:gd name="connsiteX6" fmla="*/ 757238 w 1012119"/>
+              <a:gd name="connsiteY6" fmla="*/ 1146175 h 1400209"/>
+              <a:gd name="connsiteX7" fmla="*/ 598488 w 1012119"/>
+              <a:gd name="connsiteY7" fmla="*/ 603251 h 1400209"/>
+              <a:gd name="connsiteX8" fmla="*/ 0 w 1012119"/>
+              <a:gd name="connsiteY8" fmla="*/ 232569 h 1400209"/>
+              <a:gd name="connsiteX9" fmla="*/ 145257 w 1012119"/>
+              <a:gd name="connsiteY9" fmla="*/ 0 h 1400209"/>
+              <a:gd name="connsiteX0" fmla="*/ 145257 w 1012119"/>
+              <a:gd name="connsiteY0" fmla="*/ 0 h 1407350"/>
+              <a:gd name="connsiteX1" fmla="*/ 757238 w 1012119"/>
+              <a:gd name="connsiteY1" fmla="*/ 499269 h 1407350"/>
+              <a:gd name="connsiteX2" fmla="*/ 948532 w 1012119"/>
+              <a:gd name="connsiteY2" fmla="*/ 1088231 h 1407350"/>
+              <a:gd name="connsiteX3" fmla="*/ 1011238 w 1012119"/>
+              <a:gd name="connsiteY3" fmla="*/ 1127919 h 1407350"/>
+              <a:gd name="connsiteX4" fmla="*/ 915988 w 1012119"/>
+              <a:gd name="connsiteY4" fmla="*/ 1388269 h 1407350"/>
+              <a:gd name="connsiteX5" fmla="*/ 710406 w 1012119"/>
+              <a:gd name="connsiteY5" fmla="*/ 1335088 h 1407350"/>
+              <a:gd name="connsiteX6" fmla="*/ 757238 w 1012119"/>
+              <a:gd name="connsiteY6" fmla="*/ 1146175 h 1407350"/>
+              <a:gd name="connsiteX7" fmla="*/ 598488 w 1012119"/>
+              <a:gd name="connsiteY7" fmla="*/ 603251 h 1407350"/>
+              <a:gd name="connsiteX8" fmla="*/ 0 w 1012119"/>
+              <a:gd name="connsiteY8" fmla="*/ 232569 h 1407350"/>
+              <a:gd name="connsiteX9" fmla="*/ 145257 w 1012119"/>
+              <a:gd name="connsiteY9" fmla="*/ 0 h 1407350"/>
+              <a:gd name="connsiteX0" fmla="*/ 145257 w 1071035"/>
+              <a:gd name="connsiteY0" fmla="*/ 0 h 1401208"/>
+              <a:gd name="connsiteX1" fmla="*/ 757238 w 1071035"/>
+              <a:gd name="connsiteY1" fmla="*/ 499269 h 1401208"/>
+              <a:gd name="connsiteX2" fmla="*/ 948532 w 1071035"/>
+              <a:gd name="connsiteY2" fmla="*/ 1088231 h 1401208"/>
+              <a:gd name="connsiteX3" fmla="*/ 1070770 w 1071035"/>
+              <a:gd name="connsiteY3" fmla="*/ 1211263 h 1401208"/>
+              <a:gd name="connsiteX4" fmla="*/ 915988 w 1071035"/>
+              <a:gd name="connsiteY4" fmla="*/ 1388269 h 1401208"/>
+              <a:gd name="connsiteX5" fmla="*/ 710406 w 1071035"/>
+              <a:gd name="connsiteY5" fmla="*/ 1335088 h 1401208"/>
+              <a:gd name="connsiteX6" fmla="*/ 757238 w 1071035"/>
+              <a:gd name="connsiteY6" fmla="*/ 1146175 h 1401208"/>
+              <a:gd name="connsiteX7" fmla="*/ 598488 w 1071035"/>
+              <a:gd name="connsiteY7" fmla="*/ 603251 h 1401208"/>
+              <a:gd name="connsiteX8" fmla="*/ 0 w 1071035"/>
+              <a:gd name="connsiteY8" fmla="*/ 232569 h 1401208"/>
+              <a:gd name="connsiteX9" fmla="*/ 145257 w 1071035"/>
+              <a:gd name="connsiteY9" fmla="*/ 0 h 1401208"/>
+              <a:gd name="connsiteX0" fmla="*/ 145257 w 1070966"/>
+              <a:gd name="connsiteY0" fmla="*/ 0 h 1403267"/>
+              <a:gd name="connsiteX1" fmla="*/ 757238 w 1070966"/>
+              <a:gd name="connsiteY1" fmla="*/ 499269 h 1403267"/>
+              <a:gd name="connsiteX2" fmla="*/ 948532 w 1070966"/>
+              <a:gd name="connsiteY2" fmla="*/ 1088231 h 1403267"/>
+              <a:gd name="connsiteX3" fmla="*/ 1070770 w 1070966"/>
+              <a:gd name="connsiteY3" fmla="*/ 1211263 h 1403267"/>
+              <a:gd name="connsiteX4" fmla="*/ 920751 w 1070966"/>
+              <a:gd name="connsiteY4" fmla="*/ 1397794 h 1403267"/>
+              <a:gd name="connsiteX5" fmla="*/ 710406 w 1070966"/>
+              <a:gd name="connsiteY5" fmla="*/ 1335088 h 1403267"/>
+              <a:gd name="connsiteX6" fmla="*/ 757238 w 1070966"/>
+              <a:gd name="connsiteY6" fmla="*/ 1146175 h 1403267"/>
+              <a:gd name="connsiteX7" fmla="*/ 598488 w 1070966"/>
+              <a:gd name="connsiteY7" fmla="*/ 603251 h 1403267"/>
+              <a:gd name="connsiteX8" fmla="*/ 0 w 1070966"/>
+              <a:gd name="connsiteY8" fmla="*/ 232569 h 1403267"/>
+              <a:gd name="connsiteX9" fmla="*/ 145257 w 1070966"/>
+              <a:gd name="connsiteY9" fmla="*/ 0 h 1403267"/>
+              <a:gd name="connsiteX0" fmla="*/ 145257 w 1071112"/>
+              <a:gd name="connsiteY0" fmla="*/ 0 h 1409924"/>
+              <a:gd name="connsiteX1" fmla="*/ 757238 w 1071112"/>
+              <a:gd name="connsiteY1" fmla="*/ 499269 h 1409924"/>
+              <a:gd name="connsiteX2" fmla="*/ 948532 w 1071112"/>
+              <a:gd name="connsiteY2" fmla="*/ 1088231 h 1409924"/>
+              <a:gd name="connsiteX3" fmla="*/ 1070770 w 1071112"/>
+              <a:gd name="connsiteY3" fmla="*/ 1211263 h 1409924"/>
+              <a:gd name="connsiteX4" fmla="*/ 911226 w 1071112"/>
+              <a:gd name="connsiteY4" fmla="*/ 1404938 h 1409924"/>
+              <a:gd name="connsiteX5" fmla="*/ 710406 w 1071112"/>
+              <a:gd name="connsiteY5" fmla="*/ 1335088 h 1409924"/>
+              <a:gd name="connsiteX6" fmla="*/ 757238 w 1071112"/>
+              <a:gd name="connsiteY6" fmla="*/ 1146175 h 1409924"/>
+              <a:gd name="connsiteX7" fmla="*/ 598488 w 1071112"/>
+              <a:gd name="connsiteY7" fmla="*/ 603251 h 1409924"/>
+              <a:gd name="connsiteX8" fmla="*/ 0 w 1071112"/>
+              <a:gd name="connsiteY8" fmla="*/ 232569 h 1409924"/>
+              <a:gd name="connsiteX9" fmla="*/ 145257 w 1071112"/>
+              <a:gd name="connsiteY9" fmla="*/ 0 h 1409924"/>
+              <a:gd name="connsiteX0" fmla="*/ 145257 w 1071112"/>
+              <a:gd name="connsiteY0" fmla="*/ 0 h 1413400"/>
+              <a:gd name="connsiteX1" fmla="*/ 757238 w 1071112"/>
+              <a:gd name="connsiteY1" fmla="*/ 499269 h 1413400"/>
+              <a:gd name="connsiteX2" fmla="*/ 948532 w 1071112"/>
+              <a:gd name="connsiteY2" fmla="*/ 1088231 h 1413400"/>
+              <a:gd name="connsiteX3" fmla="*/ 1070770 w 1071112"/>
+              <a:gd name="connsiteY3" fmla="*/ 1211263 h 1413400"/>
+              <a:gd name="connsiteX4" fmla="*/ 911226 w 1071112"/>
+              <a:gd name="connsiteY4" fmla="*/ 1404938 h 1413400"/>
+              <a:gd name="connsiteX5" fmla="*/ 710406 w 1071112"/>
+              <a:gd name="connsiteY5" fmla="*/ 1335088 h 1413400"/>
+              <a:gd name="connsiteX6" fmla="*/ 757238 w 1071112"/>
+              <a:gd name="connsiteY6" fmla="*/ 1146175 h 1413400"/>
+              <a:gd name="connsiteX7" fmla="*/ 598488 w 1071112"/>
+              <a:gd name="connsiteY7" fmla="*/ 603251 h 1413400"/>
+              <a:gd name="connsiteX8" fmla="*/ 0 w 1071112"/>
+              <a:gd name="connsiteY8" fmla="*/ 232569 h 1413400"/>
+              <a:gd name="connsiteX9" fmla="*/ 145257 w 1071112"/>
+              <a:gd name="connsiteY9" fmla="*/ 0 h 1413400"/>
+              <a:gd name="connsiteX0" fmla="*/ 145257 w 1071112"/>
+              <a:gd name="connsiteY0" fmla="*/ 0 h 1417659"/>
+              <a:gd name="connsiteX1" fmla="*/ 757238 w 1071112"/>
+              <a:gd name="connsiteY1" fmla="*/ 499269 h 1417659"/>
+              <a:gd name="connsiteX2" fmla="*/ 948532 w 1071112"/>
+              <a:gd name="connsiteY2" fmla="*/ 1088231 h 1417659"/>
+              <a:gd name="connsiteX3" fmla="*/ 1070770 w 1071112"/>
+              <a:gd name="connsiteY3" fmla="*/ 1211263 h 1417659"/>
+              <a:gd name="connsiteX4" fmla="*/ 911226 w 1071112"/>
+              <a:gd name="connsiteY4" fmla="*/ 1404938 h 1417659"/>
+              <a:gd name="connsiteX5" fmla="*/ 710406 w 1071112"/>
+              <a:gd name="connsiteY5" fmla="*/ 1335088 h 1417659"/>
+              <a:gd name="connsiteX6" fmla="*/ 757238 w 1071112"/>
+              <a:gd name="connsiteY6" fmla="*/ 1146175 h 1417659"/>
+              <a:gd name="connsiteX7" fmla="*/ 598488 w 1071112"/>
+              <a:gd name="connsiteY7" fmla="*/ 603251 h 1417659"/>
+              <a:gd name="connsiteX8" fmla="*/ 0 w 1071112"/>
+              <a:gd name="connsiteY8" fmla="*/ 232569 h 1417659"/>
+              <a:gd name="connsiteX9" fmla="*/ 145257 w 1071112"/>
+              <a:gd name="connsiteY9" fmla="*/ 0 h 1417659"/>
+              <a:gd name="connsiteX0" fmla="*/ 145257 w 1073321"/>
+              <a:gd name="connsiteY0" fmla="*/ 0 h 1417659"/>
+              <a:gd name="connsiteX1" fmla="*/ 757238 w 1073321"/>
+              <a:gd name="connsiteY1" fmla="*/ 499269 h 1417659"/>
+              <a:gd name="connsiteX2" fmla="*/ 948532 w 1073321"/>
+              <a:gd name="connsiteY2" fmla="*/ 1088231 h 1417659"/>
+              <a:gd name="connsiteX3" fmla="*/ 1070770 w 1073321"/>
+              <a:gd name="connsiteY3" fmla="*/ 1211263 h 1417659"/>
+              <a:gd name="connsiteX4" fmla="*/ 911226 w 1073321"/>
+              <a:gd name="connsiteY4" fmla="*/ 1404938 h 1417659"/>
+              <a:gd name="connsiteX5" fmla="*/ 710406 w 1073321"/>
+              <a:gd name="connsiteY5" fmla="*/ 1335088 h 1417659"/>
+              <a:gd name="connsiteX6" fmla="*/ 757238 w 1073321"/>
+              <a:gd name="connsiteY6" fmla="*/ 1146175 h 1417659"/>
+              <a:gd name="connsiteX7" fmla="*/ 598488 w 1073321"/>
+              <a:gd name="connsiteY7" fmla="*/ 603251 h 1417659"/>
+              <a:gd name="connsiteX8" fmla="*/ 0 w 1073321"/>
+              <a:gd name="connsiteY8" fmla="*/ 232569 h 1417659"/>
+              <a:gd name="connsiteX9" fmla="*/ 145257 w 1073321"/>
+              <a:gd name="connsiteY9" fmla="*/ 0 h 1417659"/>
+              <a:gd name="connsiteX0" fmla="*/ 145257 w 1073321"/>
+              <a:gd name="connsiteY0" fmla="*/ 0 h 1417659"/>
+              <a:gd name="connsiteX1" fmla="*/ 757238 w 1073321"/>
+              <a:gd name="connsiteY1" fmla="*/ 499269 h 1417659"/>
+              <a:gd name="connsiteX2" fmla="*/ 948532 w 1073321"/>
+              <a:gd name="connsiteY2" fmla="*/ 1088231 h 1417659"/>
+              <a:gd name="connsiteX3" fmla="*/ 1070770 w 1073321"/>
+              <a:gd name="connsiteY3" fmla="*/ 1211263 h 1417659"/>
+              <a:gd name="connsiteX4" fmla="*/ 911226 w 1073321"/>
+              <a:gd name="connsiteY4" fmla="*/ 1404938 h 1417659"/>
+              <a:gd name="connsiteX5" fmla="*/ 710406 w 1073321"/>
+              <a:gd name="connsiteY5" fmla="*/ 1335088 h 1417659"/>
+              <a:gd name="connsiteX6" fmla="*/ 757238 w 1073321"/>
+              <a:gd name="connsiteY6" fmla="*/ 1146175 h 1417659"/>
+              <a:gd name="connsiteX7" fmla="*/ 598488 w 1073321"/>
+              <a:gd name="connsiteY7" fmla="*/ 603251 h 1417659"/>
+              <a:gd name="connsiteX8" fmla="*/ 0 w 1073321"/>
+              <a:gd name="connsiteY8" fmla="*/ 232569 h 1417659"/>
+              <a:gd name="connsiteX9" fmla="*/ 145257 w 1073321"/>
+              <a:gd name="connsiteY9" fmla="*/ 0 h 1417659"/>
+              <a:gd name="connsiteX0" fmla="*/ 145257 w 1073321"/>
+              <a:gd name="connsiteY0" fmla="*/ 0 h 1417659"/>
+              <a:gd name="connsiteX1" fmla="*/ 757238 w 1073321"/>
+              <a:gd name="connsiteY1" fmla="*/ 499269 h 1417659"/>
+              <a:gd name="connsiteX2" fmla="*/ 948532 w 1073321"/>
+              <a:gd name="connsiteY2" fmla="*/ 1088231 h 1417659"/>
+              <a:gd name="connsiteX3" fmla="*/ 1070770 w 1073321"/>
+              <a:gd name="connsiteY3" fmla="*/ 1211263 h 1417659"/>
+              <a:gd name="connsiteX4" fmla="*/ 911226 w 1073321"/>
+              <a:gd name="connsiteY4" fmla="*/ 1404938 h 1417659"/>
+              <a:gd name="connsiteX5" fmla="*/ 710406 w 1073321"/>
+              <a:gd name="connsiteY5" fmla="*/ 1335088 h 1417659"/>
+              <a:gd name="connsiteX6" fmla="*/ 757238 w 1073321"/>
+              <a:gd name="connsiteY6" fmla="*/ 1146175 h 1417659"/>
+              <a:gd name="connsiteX7" fmla="*/ 598488 w 1073321"/>
+              <a:gd name="connsiteY7" fmla="*/ 603251 h 1417659"/>
+              <a:gd name="connsiteX8" fmla="*/ 0 w 1073321"/>
+              <a:gd name="connsiteY8" fmla="*/ 232569 h 1417659"/>
+              <a:gd name="connsiteX9" fmla="*/ 145257 w 1073321"/>
+              <a:gd name="connsiteY9" fmla="*/ 0 h 1417659"/>
+              <a:gd name="connsiteX0" fmla="*/ 145257 w 1073321"/>
+              <a:gd name="connsiteY0" fmla="*/ 0 h 1417659"/>
+              <a:gd name="connsiteX1" fmla="*/ 757238 w 1073321"/>
+              <a:gd name="connsiteY1" fmla="*/ 499269 h 1417659"/>
+              <a:gd name="connsiteX2" fmla="*/ 948532 w 1073321"/>
+              <a:gd name="connsiteY2" fmla="*/ 1088231 h 1417659"/>
+              <a:gd name="connsiteX3" fmla="*/ 1070770 w 1073321"/>
+              <a:gd name="connsiteY3" fmla="*/ 1211263 h 1417659"/>
+              <a:gd name="connsiteX4" fmla="*/ 911226 w 1073321"/>
+              <a:gd name="connsiteY4" fmla="*/ 1404938 h 1417659"/>
+              <a:gd name="connsiteX5" fmla="*/ 710406 w 1073321"/>
+              <a:gd name="connsiteY5" fmla="*/ 1335088 h 1417659"/>
+              <a:gd name="connsiteX6" fmla="*/ 757238 w 1073321"/>
+              <a:gd name="connsiteY6" fmla="*/ 1146175 h 1417659"/>
+              <a:gd name="connsiteX7" fmla="*/ 598488 w 1073321"/>
+              <a:gd name="connsiteY7" fmla="*/ 603251 h 1417659"/>
+              <a:gd name="connsiteX8" fmla="*/ 0 w 1073321"/>
+              <a:gd name="connsiteY8" fmla="*/ 232569 h 1417659"/>
+              <a:gd name="connsiteX9" fmla="*/ 145257 w 1073321"/>
+              <a:gd name="connsiteY9" fmla="*/ 0 h 1417659"/>
+              <a:gd name="connsiteX0" fmla="*/ 145257 w 1070931"/>
+              <a:gd name="connsiteY0" fmla="*/ 0 h 1435580"/>
+              <a:gd name="connsiteX1" fmla="*/ 757238 w 1070931"/>
+              <a:gd name="connsiteY1" fmla="*/ 499269 h 1435580"/>
+              <a:gd name="connsiteX2" fmla="*/ 948532 w 1070931"/>
+              <a:gd name="connsiteY2" fmla="*/ 1088231 h 1435580"/>
+              <a:gd name="connsiteX3" fmla="*/ 1070770 w 1070931"/>
+              <a:gd name="connsiteY3" fmla="*/ 1211263 h 1435580"/>
+              <a:gd name="connsiteX4" fmla="*/ 923132 w 1070931"/>
+              <a:gd name="connsiteY4" fmla="*/ 1428750 h 1435580"/>
+              <a:gd name="connsiteX5" fmla="*/ 710406 w 1070931"/>
+              <a:gd name="connsiteY5" fmla="*/ 1335088 h 1435580"/>
+              <a:gd name="connsiteX6" fmla="*/ 757238 w 1070931"/>
+              <a:gd name="connsiteY6" fmla="*/ 1146175 h 1435580"/>
+              <a:gd name="connsiteX7" fmla="*/ 598488 w 1070931"/>
+              <a:gd name="connsiteY7" fmla="*/ 603251 h 1435580"/>
+              <a:gd name="connsiteX8" fmla="*/ 0 w 1070931"/>
+              <a:gd name="connsiteY8" fmla="*/ 232569 h 1435580"/>
+              <a:gd name="connsiteX9" fmla="*/ 145257 w 1070931"/>
+              <a:gd name="connsiteY9" fmla="*/ 0 h 1435580"/>
+              <a:gd name="connsiteX0" fmla="*/ 145257 w 963133"/>
+              <a:gd name="connsiteY0" fmla="*/ 0 h 1439431"/>
+              <a:gd name="connsiteX1" fmla="*/ 757238 w 963133"/>
+              <a:gd name="connsiteY1" fmla="*/ 499269 h 1439431"/>
+              <a:gd name="connsiteX2" fmla="*/ 948532 w 963133"/>
+              <a:gd name="connsiteY2" fmla="*/ 1088231 h 1439431"/>
+              <a:gd name="connsiteX3" fmla="*/ 923132 w 963133"/>
+              <a:gd name="connsiteY3" fmla="*/ 1428750 h 1439431"/>
+              <a:gd name="connsiteX4" fmla="*/ 710406 w 963133"/>
+              <a:gd name="connsiteY4" fmla="*/ 1335088 h 1439431"/>
+              <a:gd name="connsiteX5" fmla="*/ 757238 w 963133"/>
+              <a:gd name="connsiteY5" fmla="*/ 1146175 h 1439431"/>
+              <a:gd name="connsiteX6" fmla="*/ 598488 w 963133"/>
+              <a:gd name="connsiteY6" fmla="*/ 603251 h 1439431"/>
+              <a:gd name="connsiteX7" fmla="*/ 0 w 963133"/>
+              <a:gd name="connsiteY7" fmla="*/ 232569 h 1439431"/>
+              <a:gd name="connsiteX8" fmla="*/ 145257 w 963133"/>
+              <a:gd name="connsiteY8" fmla="*/ 0 h 1439431"/>
+              <a:gd name="connsiteX0" fmla="*/ 145257 w 961329"/>
+              <a:gd name="connsiteY0" fmla="*/ 0 h 1429180"/>
+              <a:gd name="connsiteX1" fmla="*/ 757238 w 961329"/>
+              <a:gd name="connsiteY1" fmla="*/ 499269 h 1429180"/>
+              <a:gd name="connsiteX2" fmla="*/ 948532 w 961329"/>
+              <a:gd name="connsiteY2" fmla="*/ 1088231 h 1429180"/>
+              <a:gd name="connsiteX3" fmla="*/ 923132 w 961329"/>
+              <a:gd name="connsiteY3" fmla="*/ 1428750 h 1429180"/>
+              <a:gd name="connsiteX4" fmla="*/ 757238 w 961329"/>
+              <a:gd name="connsiteY4" fmla="*/ 1146175 h 1429180"/>
+              <a:gd name="connsiteX5" fmla="*/ 598488 w 961329"/>
+              <a:gd name="connsiteY5" fmla="*/ 603251 h 1429180"/>
+              <a:gd name="connsiteX6" fmla="*/ 0 w 961329"/>
+              <a:gd name="connsiteY6" fmla="*/ 232569 h 1429180"/>
+              <a:gd name="connsiteX7" fmla="*/ 145257 w 961329"/>
+              <a:gd name="connsiteY7" fmla="*/ 0 h 1429180"/>
+              <a:gd name="connsiteX0" fmla="*/ 145257 w 956789"/>
+              <a:gd name="connsiteY0" fmla="*/ 0 h 1241719"/>
+              <a:gd name="connsiteX1" fmla="*/ 757238 w 956789"/>
+              <a:gd name="connsiteY1" fmla="*/ 499269 h 1241719"/>
+              <a:gd name="connsiteX2" fmla="*/ 948532 w 956789"/>
+              <a:gd name="connsiteY2" fmla="*/ 1088231 h 1241719"/>
+              <a:gd name="connsiteX3" fmla="*/ 896261 w 956789"/>
+              <a:gd name="connsiteY3" fmla="*/ 1225550 h 1241719"/>
+              <a:gd name="connsiteX4" fmla="*/ 757238 w 956789"/>
+              <a:gd name="connsiteY4" fmla="*/ 1146175 h 1241719"/>
+              <a:gd name="connsiteX5" fmla="*/ 598488 w 956789"/>
+              <a:gd name="connsiteY5" fmla="*/ 603251 h 1241719"/>
+              <a:gd name="connsiteX6" fmla="*/ 0 w 956789"/>
+              <a:gd name="connsiteY6" fmla="*/ 232569 h 1241719"/>
+              <a:gd name="connsiteX7" fmla="*/ 145257 w 956789"/>
+              <a:gd name="connsiteY7" fmla="*/ 0 h 1241719"/>
+            </a:gdLst>
+            <a:ahLst/>
+            <a:cxnLst>
+              <a:cxn ang="0">
+                <a:pos x="connsiteX0" y="connsiteY0"/>
+              </a:cxn>
+              <a:cxn ang="0">
+                <a:pos x="connsiteX1" y="connsiteY1"/>
+              </a:cxn>
+              <a:cxn ang="0">
+                <a:pos x="connsiteX2" y="connsiteY2"/>
+              </a:cxn>
+              <a:cxn ang="0">
+                <a:pos x="connsiteX3" y="connsiteY3"/>
+              </a:cxn>
+              <a:cxn ang="0">
+                <a:pos x="connsiteX4" y="connsiteY4"/>
+              </a:cxn>
+              <a:cxn ang="0">
+                <a:pos x="connsiteX5" y="connsiteY5"/>
+              </a:cxn>
+              <a:cxn ang="0">
+                <a:pos x="connsiteX6" y="connsiteY6"/>
+              </a:cxn>
+              <a:cxn ang="0">
+                <a:pos x="connsiteX7" y="connsiteY7"/>
+              </a:cxn>
+            </a:cxnLst>
+            <a:rect l="l" t="t" r="r" b="b"/>
+            <a:pathLst>
+              <a:path w="956789" h="1241719">
+                <a:moveTo>
+                  <a:pt x="145257" y="0"/>
+                </a:moveTo>
+                <a:cubicBezTo>
+                  <a:pt x="271463" y="71438"/>
+                  <a:pt x="623359" y="317897"/>
+                  <a:pt x="757238" y="499269"/>
+                </a:cubicBezTo>
+                <a:cubicBezTo>
+                  <a:pt x="891117" y="680641"/>
+                  <a:pt x="906199" y="983456"/>
+                  <a:pt x="948532" y="1088231"/>
+                </a:cubicBezTo>
+                <a:cubicBezTo>
+                  <a:pt x="976181" y="1243145"/>
+                  <a:pt x="928143" y="1215893"/>
+                  <a:pt x="896261" y="1225550"/>
+                </a:cubicBezTo>
+                <a:cubicBezTo>
+                  <a:pt x="864379" y="1235207"/>
+                  <a:pt x="811345" y="1283758"/>
+                  <a:pt x="757238" y="1146175"/>
+                </a:cubicBezTo>
+                <a:cubicBezTo>
+                  <a:pt x="727340" y="944562"/>
+                  <a:pt x="724694" y="755519"/>
+                  <a:pt x="598488" y="603251"/>
+                </a:cubicBezTo>
+                <a:cubicBezTo>
+                  <a:pt x="472282" y="450983"/>
+                  <a:pt x="148961" y="220399"/>
+                  <a:pt x="0" y="232569"/>
+                </a:cubicBezTo>
+                <a:lnTo>
+                  <a:pt x="145257" y="0"/>
+                </a:lnTo>
+                <a:close/>
+              </a:path>
+            </a:pathLst>
+          </a:custGeom>
+          <a:solidFill>
+            <a:schemeClr val="bg1"/>
+          </a:solidFill>
+          <a:ln>
+            <a:noFill/>
+          </a:ln>
+        </p:spPr>
+        <p:style>
+          <a:lnRef idx="2">
+            <a:schemeClr val="accent1">
+              <a:shade val="50000"/>
+            </a:schemeClr>
+          </a:lnRef>
+          <a:fillRef idx="1">
+            <a:schemeClr val="accent1"/>
+          </a:fillRef>
+          <a:effectRef idx="0">
+            <a:schemeClr val="accent1"/>
+          </a:effectRef>
+          <a:fontRef idx="minor">
+            <a:schemeClr val="lt1"/>
+          </a:fontRef>
+        </p:style>
+        <p:txBody>
+          <a:bodyPr rtlCol="0" anchor="ctr"/>
+          <a:lstStyle/>
+          <a:p>
+            <a:pPr algn="ctr"/>
+            <a:endParaRPr lang="en-US"/>
+          </a:p>
+        </p:txBody>
+      </p:sp>
+      <p:grpSp>
+        <p:nvGrpSpPr>
+          <p:cNvPr id="21" name="Group 20"/>
+          <p:cNvGrpSpPr/>
+          <p:nvPr/>
+        </p:nvGrpSpPr>
+        <p:grpSpPr>
+          <a:xfrm>
+            <a:off x="7284707" y="944909"/>
+            <a:ext cx="1345362" cy="1667224"/>
+            <a:chOff x="3677351" y="1440440"/>
+            <a:chExt cx="1345362" cy="1667224"/>
+          </a:xfrm>
+        </p:grpSpPr>
+        <p:sp>
+          <p:nvSpPr>
+            <p:cNvPr id="17" name="Oval 16"/>
+            <p:cNvSpPr/>
+            <p:nvPr/>
+          </p:nvSpPr>
+          <p:spPr>
+            <a:xfrm>
+              <a:off x="3677351" y="1440440"/>
+              <a:ext cx="467755" cy="467755"/>
+            </a:xfrm>
+            <a:prstGeom prst="ellipse">
+              <a:avLst/>
+            </a:prstGeom>
+            <a:gradFill flip="none" rotWithShape="1">
+              <a:gsLst>
+                <a:gs pos="0">
+                  <a:schemeClr val="tx1">
+                    <a:tint val="66000"/>
+                    <a:satMod val="160000"/>
+                  </a:schemeClr>
+                </a:gs>
+                <a:gs pos="50000">
+                  <a:schemeClr val="tx1">
+                    <a:tint val="44500"/>
+                    <a:satMod val="160000"/>
+                  </a:schemeClr>
+                </a:gs>
+                <a:gs pos="100000">
+                  <a:schemeClr val="tx1">
+                    <a:tint val="23500"/>
+                    <a:satMod val="160000"/>
+                  </a:schemeClr>
+                </a:gs>
+              </a:gsLst>
+              <a:lin ang="2700000" scaled="1"/>
+              <a:tileRect/>
+            </a:gradFill>
+            <a:ln>
+              <a:noFill/>
+            </a:ln>
+          </p:spPr>
+          <p:style>
+            <a:lnRef idx="2">
+              <a:schemeClr val="accent1">
+                <a:shade val="50000"/>
+              </a:schemeClr>
+            </a:lnRef>
+            <a:fillRef idx="1">
+              <a:schemeClr val="accent1"/>
+            </a:fillRef>
+            <a:effectRef idx="0">
+              <a:schemeClr val="accent1"/>
+            </a:effectRef>
+            <a:fontRef idx="minor">
+              <a:schemeClr val="lt1"/>
+            </a:fontRef>
+          </p:style>
+          <p:txBody>
+            <a:bodyPr rtlCol="0" anchor="ctr"/>
+            <a:lstStyle/>
+            <a:p>
+              <a:pPr algn="ctr"/>
+              <a:endParaRPr lang="en-US"/>
+            </a:p>
+          </p:txBody>
+        </p:sp>
+        <p:sp>
+          <p:nvSpPr>
+            <p:cNvPr id="15" name="Oval 14"/>
+            <p:cNvSpPr/>
+            <p:nvPr/>
+          </p:nvSpPr>
+          <p:spPr>
+            <a:xfrm>
+              <a:off x="3810025" y="1638793"/>
+              <a:ext cx="236045" cy="236045"/>
+            </a:xfrm>
+            <a:prstGeom prst="ellipse">
+              <a:avLst/>
+            </a:prstGeom>
+            <a:solidFill>
+              <a:schemeClr val="tx1"/>
+            </a:solidFill>
+            <a:ln>
+              <a:noFill/>
+            </a:ln>
+          </p:spPr>
+          <p:style>
+            <a:lnRef idx="2">
+              <a:schemeClr val="accent1">
+                <a:shade val="50000"/>
+              </a:schemeClr>
+            </a:lnRef>
+            <a:fillRef idx="1">
+              <a:schemeClr val="accent1"/>
+            </a:fillRef>
+            <a:effectRef idx="0">
+              <a:schemeClr val="accent1"/>
+            </a:effectRef>
+            <a:fontRef idx="minor">
+              <a:schemeClr val="lt1"/>
+            </a:fontRef>
+          </p:style>
+          <p:txBody>
+            <a:bodyPr rtlCol="0" anchor="ctr"/>
+            <a:lstStyle/>
+            <a:p>
+              <a:pPr algn="ctr"/>
+              <a:endParaRPr lang="en-US"/>
+            </a:p>
+          </p:txBody>
+        </p:sp>
+        <p:sp>
+          <p:nvSpPr>
+            <p:cNvPr id="18" name="Oval 17"/>
+            <p:cNvSpPr/>
+            <p:nvPr/>
+          </p:nvSpPr>
+          <p:spPr>
+            <a:xfrm>
+              <a:off x="4554958" y="1440440"/>
+              <a:ext cx="467755" cy="467755"/>
+            </a:xfrm>
+            <a:prstGeom prst="ellipse">
+              <a:avLst/>
+            </a:prstGeom>
+            <a:gradFill flip="none" rotWithShape="1">
+              <a:gsLst>
+                <a:gs pos="0">
+                  <a:schemeClr val="tx1">
+                    <a:tint val="66000"/>
+                    <a:satMod val="160000"/>
+                  </a:schemeClr>
+                </a:gs>
+                <a:gs pos="50000">
+                  <a:schemeClr val="tx1">
+                    <a:tint val="44500"/>
+                    <a:satMod val="160000"/>
+                  </a:schemeClr>
+                </a:gs>
+                <a:gs pos="100000">
+                  <a:schemeClr val="tx1">
+                    <a:tint val="23500"/>
+                    <a:satMod val="160000"/>
+                  </a:schemeClr>
+                </a:gs>
+              </a:gsLst>
+              <a:lin ang="2700000" scaled="1"/>
+              <a:tileRect/>
+            </a:gradFill>
+            <a:ln>
+              <a:noFill/>
+            </a:ln>
+          </p:spPr>
+          <p:style>
+            <a:lnRef idx="2">
+              <a:schemeClr val="accent1">
+                <a:shade val="50000"/>
+              </a:schemeClr>
+            </a:lnRef>
+            <a:fillRef idx="1">
+              <a:schemeClr val="accent1"/>
+            </a:fillRef>
+            <a:effectRef idx="0">
+              <a:schemeClr val="accent1"/>
+            </a:effectRef>
+            <a:fontRef idx="minor">
+              <a:schemeClr val="lt1"/>
+            </a:fontRef>
+          </p:style>
+          <p:txBody>
+            <a:bodyPr rtlCol="0" anchor="ctr"/>
+            <a:lstStyle/>
+            <a:p>
+              <a:pPr algn="ctr"/>
+              <a:endParaRPr lang="en-US"/>
+            </a:p>
+          </p:txBody>
+        </p:sp>
+        <p:sp>
+          <p:nvSpPr>
+            <p:cNvPr id="16" name="Oval 15"/>
+            <p:cNvSpPr/>
+            <p:nvPr/>
+          </p:nvSpPr>
+          <p:spPr>
+            <a:xfrm>
+              <a:off x="4687632" y="1638793"/>
+              <a:ext cx="236045" cy="236045"/>
+            </a:xfrm>
+            <a:prstGeom prst="ellipse">
+              <a:avLst/>
+            </a:prstGeom>
+            <a:solidFill>
+              <a:schemeClr val="tx1"/>
+            </a:solidFill>
+            <a:ln>
+              <a:noFill/>
+            </a:ln>
+          </p:spPr>
+          <p:style>
+            <a:lnRef idx="2">
+              <a:schemeClr val="accent1">
+                <a:shade val="50000"/>
+              </a:schemeClr>
+            </a:lnRef>
+            <a:fillRef idx="1">
+              <a:schemeClr val="accent1"/>
+            </a:fillRef>
+            <a:effectRef idx="0">
+              <a:schemeClr val="accent1"/>
+            </a:effectRef>
+            <a:fontRef idx="minor">
+              <a:schemeClr val="lt1"/>
+            </a:fontRef>
+          </p:style>
+          <p:txBody>
+            <a:bodyPr rtlCol="0" anchor="ctr"/>
+            <a:lstStyle/>
+            <a:p>
+              <a:pPr algn="ctr"/>
+              <a:endParaRPr lang="en-US"/>
+            </a:p>
+          </p:txBody>
+        </p:sp>
+        <p:sp>
+          <p:nvSpPr>
+            <p:cNvPr id="19" name="Moon 18"/>
+            <p:cNvSpPr/>
+            <p:nvPr/>
+          </p:nvSpPr>
+          <p:spPr>
+            <a:xfrm rot="16200000">
+              <a:off x="4058991" y="2284713"/>
+              <a:ext cx="548634" cy="1097268"/>
+            </a:xfrm>
+            <a:prstGeom prst="moon">
+              <a:avLst/>
+            </a:prstGeom>
+          </p:spPr>
+          <p:style>
+            <a:lnRef idx="2">
+              <a:schemeClr val="accent1">
+                <a:shade val="50000"/>
+              </a:schemeClr>
+            </a:lnRef>
+            <a:fillRef idx="1">
+              <a:schemeClr val="accent1"/>
+            </a:fillRef>
+            <a:effectRef idx="0">
+              <a:schemeClr val="accent1"/>
+            </a:effectRef>
+            <a:fontRef idx="minor">
+              <a:schemeClr val="lt1"/>
+            </a:fontRef>
+          </p:style>
+          <p:txBody>
+            <a:bodyPr rtlCol="0" anchor="ctr"/>
+            <a:lstStyle/>
+            <a:p>
+              <a:pPr algn="ctr"/>
+              <a:endParaRPr lang="en-US"/>
+            </a:p>
+          </p:txBody>
+        </p:sp>
+        <p:sp>
+          <p:nvSpPr>
+            <p:cNvPr id="20" name="Freeform 19"/>
+            <p:cNvSpPr/>
+            <p:nvPr/>
+          </p:nvSpPr>
+          <p:spPr>
+            <a:xfrm>
+              <a:off x="4090988" y="1971675"/>
+              <a:ext cx="285750" cy="523875"/>
+            </a:xfrm>
+            <a:custGeom>
+              <a:avLst/>
+              <a:gdLst>
+                <a:gd name="connsiteX0" fmla="*/ 142875 w 285750"/>
+                <a:gd name="connsiteY0" fmla="*/ 0 h 523875"/>
+                <a:gd name="connsiteX1" fmla="*/ 0 w 285750"/>
+                <a:gd name="connsiteY1" fmla="*/ 457200 h 523875"/>
+                <a:gd name="connsiteX2" fmla="*/ 285750 w 285750"/>
+                <a:gd name="connsiteY2" fmla="*/ 523875 h 523875"/>
+              </a:gdLst>
+              <a:ahLst/>
+              <a:cxnLst>
+                <a:cxn ang="0">
+                  <a:pos x="connsiteX0" y="connsiteY0"/>
+                </a:cxn>
+                <a:cxn ang="0">
+                  <a:pos x="connsiteX1" y="connsiteY1"/>
+                </a:cxn>
+                <a:cxn ang="0">
+                  <a:pos x="connsiteX2" y="connsiteY2"/>
+                </a:cxn>
+              </a:cxnLst>
+              <a:rect l="l" t="t" r="r" b="b"/>
+              <a:pathLst>
+                <a:path w="285750" h="523875">
+                  <a:moveTo>
+                    <a:pt x="142875" y="0"/>
+                  </a:moveTo>
+                  <a:lnTo>
+                    <a:pt x="0" y="457200"/>
+                  </a:lnTo>
+                  <a:lnTo>
+                    <a:pt x="285750" y="523875"/>
+                  </a:lnTo>
+                </a:path>
+              </a:pathLst>
+            </a:custGeom>
+            <a:noFill/>
+            <a:ln w="38100" cap="rnd">
+              <a:solidFill>
+                <a:schemeClr val="bg1">
+                  <a:lumMod val="75000"/>
+                </a:schemeClr>
+              </a:solidFill>
+              <a:round/>
+            </a:ln>
+          </p:spPr>
+          <p:style>
+            <a:lnRef idx="2">
+              <a:schemeClr val="accent1">
+                <a:shade val="50000"/>
+              </a:schemeClr>
+            </a:lnRef>
+            <a:fillRef idx="1">
+              <a:schemeClr val="accent1"/>
+            </a:fillRef>
+            <a:effectRef idx="0">
+              <a:schemeClr val="accent1"/>
+            </a:effectRef>
+            <a:fontRef idx="minor">
+              <a:schemeClr val="lt1"/>
+            </a:fontRef>
+          </p:style>
+          <p:txBody>
+            <a:bodyPr rtlCol="0" anchor="ctr"/>
+            <a:lstStyle/>
+            <a:p>
+              <a:pPr algn="ctr"/>
+              <a:endParaRPr lang="en-US"/>
+            </a:p>
+          </p:txBody>
+        </p:sp>
+      </p:grpSp>
+    </p:spTree>
+    <p:extLst>
+      <p:ext uri="{BB962C8B-B14F-4D97-AF65-F5344CB8AC3E}">
+        <p14:creationId xmlns:p14="http://schemas.microsoft.com/office/powerpoint/2010/main" val="703165153"/>
+      </p:ext>
+    </p:extLst>
+  </p:cSld>
+  <p:clrMapOvr>
+    <a:masterClrMapping/>
+  </p:clrMapOvr>
+</p:sld>
+</file>
+
 <file path=ppt/theme/theme1.xml><?xml version="1.0" encoding="utf-8"?>
 <a:theme xmlns:a="http://schemas.openxmlformats.org/drawingml/2006/main" name="Office Theme">
   <a:themeElements>

</xml_diff>